<commit_message>
changing map directory names. randomizing report levels. better trust questions.
(cherry picked from commit a6e1811cdeb9c9ad2b960e3bbc85e3f9d12f6b71)
</commit_message>
<xml_diff>
--- a/web_gridworld/admin/figures.pptx
+++ b/web_gridworld/admin/figures.pptx
@@ -7,7 +7,8 @@
   <p:sldIdLst>
     <p:sldId id="256" r:id="rId2"/>
     <p:sldId id="257" r:id="rId3"/>
-    <p:sldId id="258" r:id="rId4"/>
+    <p:sldId id="259" r:id="rId4"/>
+    <p:sldId id="258" r:id="rId5"/>
   </p:sldIdLst>
   <p:sldSz cx="12192000" cy="6858000"/>
   <p:notesSz cx="6858000" cy="9144000"/>
@@ -273,7 +274,7 @@
           <a:p>
             <a:fld id="{643F3906-2A15-4AA7-AE63-C2723486BB5A}" type="datetimeFigureOut">
               <a:rPr lang="en-US" smtClean="0"/>
-              <a:t>6/14/2021</a:t>
+              <a:t>7/26/2021</a:t>
             </a:fld>
             <a:endParaRPr lang="en-US"/>
           </a:p>
@@ -471,7 +472,7 @@
           <a:p>
             <a:fld id="{643F3906-2A15-4AA7-AE63-C2723486BB5A}" type="datetimeFigureOut">
               <a:rPr lang="en-US" smtClean="0"/>
-              <a:t>6/14/2021</a:t>
+              <a:t>7/26/2021</a:t>
             </a:fld>
             <a:endParaRPr lang="en-US"/>
           </a:p>
@@ -679,7 +680,7 @@
           <a:p>
             <a:fld id="{643F3906-2A15-4AA7-AE63-C2723486BB5A}" type="datetimeFigureOut">
               <a:rPr lang="en-US" smtClean="0"/>
-              <a:t>6/14/2021</a:t>
+              <a:t>7/26/2021</a:t>
             </a:fld>
             <a:endParaRPr lang="en-US"/>
           </a:p>
@@ -877,7 +878,7 @@
           <a:p>
             <a:fld id="{643F3906-2A15-4AA7-AE63-C2723486BB5A}" type="datetimeFigureOut">
               <a:rPr lang="en-US" smtClean="0"/>
-              <a:t>6/14/2021</a:t>
+              <a:t>7/26/2021</a:t>
             </a:fld>
             <a:endParaRPr lang="en-US"/>
           </a:p>
@@ -1152,7 +1153,7 @@
           <a:p>
             <a:fld id="{643F3906-2A15-4AA7-AE63-C2723486BB5A}" type="datetimeFigureOut">
               <a:rPr lang="en-US" smtClean="0"/>
-              <a:t>6/14/2021</a:t>
+              <a:t>7/26/2021</a:t>
             </a:fld>
             <a:endParaRPr lang="en-US"/>
           </a:p>
@@ -1417,7 +1418,7 @@
           <a:p>
             <a:fld id="{643F3906-2A15-4AA7-AE63-C2723486BB5A}" type="datetimeFigureOut">
               <a:rPr lang="en-US" smtClean="0"/>
-              <a:t>6/14/2021</a:t>
+              <a:t>7/26/2021</a:t>
             </a:fld>
             <a:endParaRPr lang="en-US"/>
           </a:p>
@@ -1829,7 +1830,7 @@
           <a:p>
             <a:fld id="{643F3906-2A15-4AA7-AE63-C2723486BB5A}" type="datetimeFigureOut">
               <a:rPr lang="en-US" smtClean="0"/>
-              <a:t>6/14/2021</a:t>
+              <a:t>7/26/2021</a:t>
             </a:fld>
             <a:endParaRPr lang="en-US"/>
           </a:p>
@@ -1970,7 +1971,7 @@
           <a:p>
             <a:fld id="{643F3906-2A15-4AA7-AE63-C2723486BB5A}" type="datetimeFigureOut">
               <a:rPr lang="en-US" smtClean="0"/>
-              <a:t>6/14/2021</a:t>
+              <a:t>7/26/2021</a:t>
             </a:fld>
             <a:endParaRPr lang="en-US"/>
           </a:p>
@@ -2083,7 +2084,7 @@
           <a:p>
             <a:fld id="{643F3906-2A15-4AA7-AE63-C2723486BB5A}" type="datetimeFigureOut">
               <a:rPr lang="en-US" smtClean="0"/>
-              <a:t>6/14/2021</a:t>
+              <a:t>7/26/2021</a:t>
             </a:fld>
             <a:endParaRPr lang="en-US"/>
           </a:p>
@@ -2394,7 +2395,7 @@
           <a:p>
             <a:fld id="{643F3906-2A15-4AA7-AE63-C2723486BB5A}" type="datetimeFigureOut">
               <a:rPr lang="en-US" smtClean="0"/>
-              <a:t>6/14/2021</a:t>
+              <a:t>7/26/2021</a:t>
             </a:fld>
             <a:endParaRPr lang="en-US"/>
           </a:p>
@@ -2682,7 +2683,7 @@
           <a:p>
             <a:fld id="{643F3906-2A15-4AA7-AE63-C2723486BB5A}" type="datetimeFigureOut">
               <a:rPr lang="en-US" smtClean="0"/>
-              <a:t>6/14/2021</a:t>
+              <a:t>7/26/2021</a:t>
             </a:fld>
             <a:endParaRPr lang="en-US"/>
           </a:p>
@@ -2923,7 +2924,7 @@
           <a:p>
             <a:fld id="{643F3906-2A15-4AA7-AE63-C2723486BB5A}" type="datetimeFigureOut">
               <a:rPr lang="en-US" smtClean="0"/>
-              <a:t>6/14/2021</a:t>
+              <a:t>7/26/2021</a:t>
             </a:fld>
             <a:endParaRPr lang="en-US"/>
           </a:p>
@@ -4540,7 +4541,7 @@
           </p:cNvPicPr>
           <p:nvPr/>
         </p:nvPicPr>
-        <p:blipFill>
+        <p:blipFill rotWithShape="1">
           <a:blip r:embed="rId2">
             <a:extLst>
               <a:ext uri="{28A0092B-C50C-407E-A947-70E740481C1C}">
@@ -4548,161 +4549,19 @@
               </a:ext>
             </a:extLst>
           </a:blip>
-          <a:stretch>
-            <a:fillRect/>
-          </a:stretch>
+          <a:srcRect t="36069"/>
+          <a:stretch/>
         </p:blipFill>
         <p:spPr>
           <a:xfrm>
-            <a:off x="774491" y="1150011"/>
-            <a:ext cx="8890418" cy="4583378"/>
+            <a:off x="1778832" y="1963886"/>
+            <a:ext cx="8890418" cy="2930228"/>
           </a:xfrm>
           <a:prstGeom prst="rect">
             <a:avLst/>
           </a:prstGeom>
         </p:spPr>
       </p:pic>
-      <p:sp>
-        <p:nvSpPr>
-          <p:cNvPr id="6" name="TextBox 5">
-            <a:extLst>
-              <a:ext uri="{FF2B5EF4-FFF2-40B4-BE49-F238E27FC236}">
-                <a16:creationId xmlns:a16="http://schemas.microsoft.com/office/drawing/2014/main" id="{418BFDCA-85A6-4E1C-AA09-79AF4BD3BC9B}"/>
-              </a:ext>
-            </a:extLst>
-          </p:cNvPr>
-          <p:cNvSpPr txBox="1"/>
-          <p:nvPr/>
-        </p:nvSpPr>
-        <p:spPr>
-          <a:xfrm>
-            <a:off x="848435" y="1733262"/>
-            <a:ext cx="1977465" cy="276999"/>
-          </a:xfrm>
-          <a:prstGeom prst="rect">
-            <a:avLst/>
-          </a:prstGeom>
-          <a:solidFill>
-            <a:schemeClr val="bg1"/>
-          </a:solidFill>
-          <a:ln w="38100">
-            <a:solidFill>
-              <a:schemeClr val="accent1"/>
-            </a:solidFill>
-          </a:ln>
-        </p:spPr>
-        <p:txBody>
-          <a:bodyPr wrap="none" rtlCol="0">
-            <a:spAutoFit/>
-          </a:bodyPr>
-          <a:lstStyle/>
-          <a:p>
-            <a:pPr algn="ctr"/>
-            <a:r>
-              <a:rPr lang="en-US" sz="1200" dirty="0"/>
-              <a:t>Robot </a:t>
-            </a:r>
-            <a:r>
-              <a:rPr lang="en-US" sz="1200" b="1" dirty="0"/>
-              <a:t>self-confidence</a:t>
-            </a:r>
-            <a:r>
-              <a:rPr lang="en-US" sz="1200" dirty="0"/>
-              <a:t> report</a:t>
-            </a:r>
-          </a:p>
-        </p:txBody>
-      </p:sp>
-      <p:cxnSp>
-        <p:nvCxnSpPr>
-          <p:cNvPr id="13" name="Straight Arrow Connector 12">
-            <a:extLst>
-              <a:ext uri="{FF2B5EF4-FFF2-40B4-BE49-F238E27FC236}">
-                <a16:creationId xmlns:a16="http://schemas.microsoft.com/office/drawing/2014/main" id="{8B631DB7-0710-47FE-9154-840770392DE8}"/>
-              </a:ext>
-            </a:extLst>
-          </p:cNvPr>
-          <p:cNvCxnSpPr>
-            <a:cxnSpLocks/>
-            <a:stCxn id="6" idx="2"/>
-          </p:cNvCxnSpPr>
-          <p:nvPr/>
-        </p:nvCxnSpPr>
-        <p:spPr>
-          <a:xfrm>
-            <a:off x="1837168" y="2010261"/>
-            <a:ext cx="156732" cy="478939"/>
-          </a:xfrm>
-          <a:prstGeom prst="straightConnector1">
-            <a:avLst/>
-          </a:prstGeom>
-          <a:ln w="38100">
-            <a:solidFill>
-              <a:schemeClr val="accent1"/>
-            </a:solidFill>
-            <a:tailEnd type="triangle"/>
-          </a:ln>
-        </p:spPr>
-        <p:style>
-          <a:lnRef idx="1">
-            <a:schemeClr val="accent1"/>
-          </a:lnRef>
-          <a:fillRef idx="0">
-            <a:schemeClr val="accent1"/>
-          </a:fillRef>
-          <a:effectRef idx="0">
-            <a:schemeClr val="accent1"/>
-          </a:effectRef>
-          <a:fontRef idx="minor">
-            <a:schemeClr val="tx1"/>
-          </a:fontRef>
-        </p:style>
-      </p:cxnSp>
-      <p:cxnSp>
-        <p:nvCxnSpPr>
-          <p:cNvPr id="31" name="Straight Arrow Connector 30">
-            <a:extLst>
-              <a:ext uri="{FF2B5EF4-FFF2-40B4-BE49-F238E27FC236}">
-                <a16:creationId xmlns:a16="http://schemas.microsoft.com/office/drawing/2014/main" id="{E88D192A-4E84-4EB2-81B9-8E7E18EDBB49}"/>
-              </a:ext>
-            </a:extLst>
-          </p:cNvPr>
-          <p:cNvCxnSpPr>
-            <a:cxnSpLocks/>
-            <a:stCxn id="6" idx="2"/>
-          </p:cNvCxnSpPr>
-          <p:nvPr/>
-        </p:nvCxnSpPr>
-        <p:spPr>
-          <a:xfrm>
-            <a:off x="1837168" y="2010261"/>
-            <a:ext cx="2836432" cy="478939"/>
-          </a:xfrm>
-          <a:prstGeom prst="straightConnector1">
-            <a:avLst/>
-          </a:prstGeom>
-          <a:ln w="38100">
-            <a:solidFill>
-              <a:schemeClr val="accent1"/>
-            </a:solidFill>
-            <a:tailEnd type="triangle"/>
-          </a:ln>
-        </p:spPr>
-        <p:style>
-          <a:lnRef idx="1">
-            <a:schemeClr val="accent1"/>
-          </a:lnRef>
-          <a:fillRef idx="0">
-            <a:schemeClr val="accent1"/>
-          </a:fillRef>
-          <a:effectRef idx="0">
-            <a:schemeClr val="accent1"/>
-          </a:effectRef>
-          <a:fontRef idx="minor">
-            <a:schemeClr val="tx1"/>
-          </a:fontRef>
-        </p:style>
-      </p:cxnSp>
     </p:spTree>
     <p:extLst>
       <p:ext uri="{BB962C8B-B14F-4D97-AF65-F5344CB8AC3E}">
@@ -4717,6 +4576,213 @@
 </file>
 
 <file path=ppt/slides/slide3.xml><?xml version="1.0" encoding="utf-8"?>
+<p:sld xmlns:a="http://schemas.openxmlformats.org/drawingml/2006/main" xmlns:r="http://schemas.openxmlformats.org/officeDocument/2006/relationships" xmlns:p="http://schemas.openxmlformats.org/presentationml/2006/main">
+  <p:cSld>
+    <p:spTree>
+      <p:nvGrpSpPr>
+        <p:cNvPr id="1" name=""/>
+        <p:cNvGrpSpPr/>
+        <p:nvPr/>
+      </p:nvGrpSpPr>
+      <p:grpSpPr>
+        <a:xfrm>
+          <a:off x="0" y="0"/>
+          <a:ext cx="0" cy="0"/>
+          <a:chOff x="0" y="0"/>
+          <a:chExt cx="0" cy="0"/>
+        </a:xfrm>
+      </p:grpSpPr>
+      <p:pic>
+        <p:nvPicPr>
+          <p:cNvPr id="4" name="Picture 3">
+            <a:extLst>
+              <a:ext uri="{FF2B5EF4-FFF2-40B4-BE49-F238E27FC236}">
+                <a16:creationId xmlns:a16="http://schemas.microsoft.com/office/drawing/2014/main" id="{5F7D85CC-CA08-4DFF-BFBF-625A22204961}"/>
+              </a:ext>
+            </a:extLst>
+          </p:cNvPr>
+          <p:cNvPicPr>
+            <a:picLocks noChangeAspect="1"/>
+          </p:cNvPicPr>
+          <p:nvPr/>
+        </p:nvPicPr>
+        <p:blipFill>
+          <a:blip r:embed="rId2">
+            <a:extLst>
+              <a:ext uri="{28A0092B-C50C-407E-A947-70E740481C1C}">
+                <a14:useLocalDpi xmlns:a14="http://schemas.microsoft.com/office/drawing/2010/main" val="0"/>
+              </a:ext>
+            </a:extLst>
+          </a:blip>
+          <a:stretch>
+            <a:fillRect/>
+          </a:stretch>
+        </p:blipFill>
+        <p:spPr>
+          <a:xfrm>
+            <a:off x="774491" y="1150011"/>
+            <a:ext cx="8890418" cy="4583378"/>
+          </a:xfrm>
+          <a:prstGeom prst="rect">
+            <a:avLst/>
+          </a:prstGeom>
+        </p:spPr>
+      </p:pic>
+      <p:sp>
+        <p:nvSpPr>
+          <p:cNvPr id="6" name="TextBox 5">
+            <a:extLst>
+              <a:ext uri="{FF2B5EF4-FFF2-40B4-BE49-F238E27FC236}">
+                <a16:creationId xmlns:a16="http://schemas.microsoft.com/office/drawing/2014/main" id="{418BFDCA-85A6-4E1C-AA09-79AF4BD3BC9B}"/>
+              </a:ext>
+            </a:extLst>
+          </p:cNvPr>
+          <p:cNvSpPr txBox="1"/>
+          <p:nvPr/>
+        </p:nvSpPr>
+        <p:spPr>
+          <a:xfrm>
+            <a:off x="848435" y="1733262"/>
+            <a:ext cx="1977465" cy="276999"/>
+          </a:xfrm>
+          <a:prstGeom prst="rect">
+            <a:avLst/>
+          </a:prstGeom>
+          <a:solidFill>
+            <a:schemeClr val="bg1"/>
+          </a:solidFill>
+          <a:ln w="38100">
+            <a:solidFill>
+              <a:schemeClr val="accent1"/>
+            </a:solidFill>
+          </a:ln>
+        </p:spPr>
+        <p:txBody>
+          <a:bodyPr wrap="none" rtlCol="0">
+            <a:spAutoFit/>
+          </a:bodyPr>
+          <a:lstStyle/>
+          <a:p>
+            <a:pPr algn="ctr"/>
+            <a:r>
+              <a:rPr lang="en-US" sz="1200" dirty="0"/>
+              <a:t>Robot </a:t>
+            </a:r>
+            <a:r>
+              <a:rPr lang="en-US" sz="1200" b="1" dirty="0"/>
+              <a:t>self-confidence</a:t>
+            </a:r>
+            <a:r>
+              <a:rPr lang="en-US" sz="1200" dirty="0"/>
+              <a:t> report</a:t>
+            </a:r>
+          </a:p>
+        </p:txBody>
+      </p:sp>
+      <p:cxnSp>
+        <p:nvCxnSpPr>
+          <p:cNvPr id="13" name="Straight Arrow Connector 12">
+            <a:extLst>
+              <a:ext uri="{FF2B5EF4-FFF2-40B4-BE49-F238E27FC236}">
+                <a16:creationId xmlns:a16="http://schemas.microsoft.com/office/drawing/2014/main" id="{8B631DB7-0710-47FE-9154-840770392DE8}"/>
+              </a:ext>
+            </a:extLst>
+          </p:cNvPr>
+          <p:cNvCxnSpPr>
+            <a:cxnSpLocks/>
+            <a:stCxn id="6" idx="2"/>
+          </p:cNvCxnSpPr>
+          <p:nvPr/>
+        </p:nvCxnSpPr>
+        <p:spPr>
+          <a:xfrm>
+            <a:off x="1837168" y="2010261"/>
+            <a:ext cx="156732" cy="478939"/>
+          </a:xfrm>
+          <a:prstGeom prst="straightConnector1">
+            <a:avLst/>
+          </a:prstGeom>
+          <a:ln w="38100">
+            <a:solidFill>
+              <a:schemeClr val="accent1"/>
+            </a:solidFill>
+            <a:tailEnd type="triangle"/>
+          </a:ln>
+        </p:spPr>
+        <p:style>
+          <a:lnRef idx="1">
+            <a:schemeClr val="accent1"/>
+          </a:lnRef>
+          <a:fillRef idx="0">
+            <a:schemeClr val="accent1"/>
+          </a:fillRef>
+          <a:effectRef idx="0">
+            <a:schemeClr val="accent1"/>
+          </a:effectRef>
+          <a:fontRef idx="minor">
+            <a:schemeClr val="tx1"/>
+          </a:fontRef>
+        </p:style>
+      </p:cxnSp>
+      <p:cxnSp>
+        <p:nvCxnSpPr>
+          <p:cNvPr id="31" name="Straight Arrow Connector 30">
+            <a:extLst>
+              <a:ext uri="{FF2B5EF4-FFF2-40B4-BE49-F238E27FC236}">
+                <a16:creationId xmlns:a16="http://schemas.microsoft.com/office/drawing/2014/main" id="{E88D192A-4E84-4EB2-81B9-8E7E18EDBB49}"/>
+              </a:ext>
+            </a:extLst>
+          </p:cNvPr>
+          <p:cNvCxnSpPr>
+            <a:cxnSpLocks/>
+            <a:stCxn id="6" idx="2"/>
+          </p:cNvCxnSpPr>
+          <p:nvPr/>
+        </p:nvCxnSpPr>
+        <p:spPr>
+          <a:xfrm>
+            <a:off x="1837168" y="2010261"/>
+            <a:ext cx="2836432" cy="478939"/>
+          </a:xfrm>
+          <a:prstGeom prst="straightConnector1">
+            <a:avLst/>
+          </a:prstGeom>
+          <a:ln w="38100">
+            <a:solidFill>
+              <a:schemeClr val="accent1"/>
+            </a:solidFill>
+            <a:tailEnd type="triangle"/>
+          </a:ln>
+        </p:spPr>
+        <p:style>
+          <a:lnRef idx="1">
+            <a:schemeClr val="accent1"/>
+          </a:lnRef>
+          <a:fillRef idx="0">
+            <a:schemeClr val="accent1"/>
+          </a:fillRef>
+          <a:effectRef idx="0">
+            <a:schemeClr val="accent1"/>
+          </a:effectRef>
+          <a:fontRef idx="minor">
+            <a:schemeClr val="tx1"/>
+          </a:fontRef>
+        </p:style>
+      </p:cxnSp>
+    </p:spTree>
+    <p:extLst>
+      <p:ext uri="{BB962C8B-B14F-4D97-AF65-F5344CB8AC3E}">
+        <p14:creationId xmlns:p14="http://schemas.microsoft.com/office/powerpoint/2010/main" val="3219794477"/>
+      </p:ext>
+    </p:extLst>
+  </p:cSld>
+  <p:clrMapOvr>
+    <a:masterClrMapping/>
+  </p:clrMapOvr>
+</p:sld>
+</file>
+
+<file path=ppt/slides/slide4.xml><?xml version="1.0" encoding="utf-8"?>
 <p:sld xmlns:a="http://schemas.openxmlformats.org/drawingml/2006/main" xmlns:r="http://schemas.openxmlformats.org/officeDocument/2006/relationships" xmlns:p="http://schemas.openxmlformats.org/presentationml/2006/main">
   <p:cSld>
     <p:spTree>

</xml_diff>

<commit_message>
updating intermediate tutorial images
</commit_message>
<xml_diff>
--- a/web_gridworld/admin/figures.pptx
+++ b/web_gridworld/admin/figures.pptx
@@ -9,6 +9,7 @@
     <p:sldId id="257" r:id="rId3"/>
     <p:sldId id="259" r:id="rId4"/>
     <p:sldId id="258" r:id="rId5"/>
+    <p:sldId id="260" r:id="rId6"/>
   </p:sldIdLst>
   <p:sldSz cx="12192000" cy="6858000"/>
   <p:notesSz cx="6858000" cy="9144000"/>
@@ -274,7 +275,7 @@
           <a:p>
             <a:fld id="{643F3906-2A15-4AA7-AE63-C2723486BB5A}" type="datetimeFigureOut">
               <a:rPr lang="en-US" smtClean="0"/>
-              <a:t>7/26/2021</a:t>
+              <a:t>7/29/2021</a:t>
             </a:fld>
             <a:endParaRPr lang="en-US"/>
           </a:p>
@@ -472,7 +473,7 @@
           <a:p>
             <a:fld id="{643F3906-2A15-4AA7-AE63-C2723486BB5A}" type="datetimeFigureOut">
               <a:rPr lang="en-US" smtClean="0"/>
-              <a:t>7/26/2021</a:t>
+              <a:t>7/29/2021</a:t>
             </a:fld>
             <a:endParaRPr lang="en-US"/>
           </a:p>
@@ -680,7 +681,7 @@
           <a:p>
             <a:fld id="{643F3906-2A15-4AA7-AE63-C2723486BB5A}" type="datetimeFigureOut">
               <a:rPr lang="en-US" smtClean="0"/>
-              <a:t>7/26/2021</a:t>
+              <a:t>7/29/2021</a:t>
             </a:fld>
             <a:endParaRPr lang="en-US"/>
           </a:p>
@@ -878,7 +879,7 @@
           <a:p>
             <a:fld id="{643F3906-2A15-4AA7-AE63-C2723486BB5A}" type="datetimeFigureOut">
               <a:rPr lang="en-US" smtClean="0"/>
-              <a:t>7/26/2021</a:t>
+              <a:t>7/29/2021</a:t>
             </a:fld>
             <a:endParaRPr lang="en-US"/>
           </a:p>
@@ -1153,7 +1154,7 @@
           <a:p>
             <a:fld id="{643F3906-2A15-4AA7-AE63-C2723486BB5A}" type="datetimeFigureOut">
               <a:rPr lang="en-US" smtClean="0"/>
-              <a:t>7/26/2021</a:t>
+              <a:t>7/29/2021</a:t>
             </a:fld>
             <a:endParaRPr lang="en-US"/>
           </a:p>
@@ -1418,7 +1419,7 @@
           <a:p>
             <a:fld id="{643F3906-2A15-4AA7-AE63-C2723486BB5A}" type="datetimeFigureOut">
               <a:rPr lang="en-US" smtClean="0"/>
-              <a:t>7/26/2021</a:t>
+              <a:t>7/29/2021</a:t>
             </a:fld>
             <a:endParaRPr lang="en-US"/>
           </a:p>
@@ -1830,7 +1831,7 @@
           <a:p>
             <a:fld id="{643F3906-2A15-4AA7-AE63-C2723486BB5A}" type="datetimeFigureOut">
               <a:rPr lang="en-US" smtClean="0"/>
-              <a:t>7/26/2021</a:t>
+              <a:t>7/29/2021</a:t>
             </a:fld>
             <a:endParaRPr lang="en-US"/>
           </a:p>
@@ -1971,7 +1972,7 @@
           <a:p>
             <a:fld id="{643F3906-2A15-4AA7-AE63-C2723486BB5A}" type="datetimeFigureOut">
               <a:rPr lang="en-US" smtClean="0"/>
-              <a:t>7/26/2021</a:t>
+              <a:t>7/29/2021</a:t>
             </a:fld>
             <a:endParaRPr lang="en-US"/>
           </a:p>
@@ -2084,7 +2085,7 @@
           <a:p>
             <a:fld id="{643F3906-2A15-4AA7-AE63-C2723486BB5A}" type="datetimeFigureOut">
               <a:rPr lang="en-US" smtClean="0"/>
-              <a:t>7/26/2021</a:t>
+              <a:t>7/29/2021</a:t>
             </a:fld>
             <a:endParaRPr lang="en-US"/>
           </a:p>
@@ -2395,7 +2396,7 @@
           <a:p>
             <a:fld id="{643F3906-2A15-4AA7-AE63-C2723486BB5A}" type="datetimeFigureOut">
               <a:rPr lang="en-US" smtClean="0"/>
-              <a:t>7/26/2021</a:t>
+              <a:t>7/29/2021</a:t>
             </a:fld>
             <a:endParaRPr lang="en-US"/>
           </a:p>
@@ -2683,7 +2684,7 @@
           <a:p>
             <a:fld id="{643F3906-2A15-4AA7-AE63-C2723486BB5A}" type="datetimeFigureOut">
               <a:rPr lang="en-US" smtClean="0"/>
-              <a:t>7/26/2021</a:t>
+              <a:t>7/29/2021</a:t>
             </a:fld>
             <a:endParaRPr lang="en-US"/>
           </a:p>
@@ -2924,7 +2925,7 @@
           <a:p>
             <a:fld id="{643F3906-2A15-4AA7-AE63-C2723486BB5A}" type="datetimeFigureOut">
               <a:rPr lang="en-US" smtClean="0"/>
-              <a:t>7/26/2021</a:t>
+              <a:t>7/29/2021</a:t>
             </a:fld>
             <a:endParaRPr lang="en-US"/>
           </a:p>
@@ -4606,7 +4607,7 @@
           </p:cNvPicPr>
           <p:nvPr/>
         </p:nvPicPr>
-        <p:blipFill>
+        <p:blipFill rotWithShape="1">
           <a:blip r:embed="rId2">
             <a:extLst>
               <a:ext uri="{28A0092B-C50C-407E-A947-70E740481C1C}">
@@ -4614,14 +4615,13 @@
               </a:ext>
             </a:extLst>
           </a:blip>
-          <a:stretch>
-            <a:fillRect/>
-          </a:stretch>
+          <a:srcRect t="29219"/>
+          <a:stretch/>
         </p:blipFill>
         <p:spPr>
           <a:xfrm>
-            <a:off x="774491" y="1150011"/>
-            <a:ext cx="8890418" cy="4583378"/>
+            <a:off x="774491" y="2489199"/>
+            <a:ext cx="8890418" cy="3244189"/>
           </a:xfrm>
           <a:prstGeom prst="rect">
             <a:avLst/>
@@ -4724,6 +4724,44 @@
           </a:fontRef>
         </p:style>
       </p:cxnSp>
+      <p:sp>
+        <p:nvSpPr>
+          <p:cNvPr id="2" name="TextBox 1">
+            <a:extLst>
+              <a:ext uri="{FF2B5EF4-FFF2-40B4-BE49-F238E27FC236}">
+                <a16:creationId xmlns:a16="http://schemas.microsoft.com/office/drawing/2014/main" id="{C788FD72-2BC7-444A-AE03-53E051A83CEE}"/>
+              </a:ext>
+            </a:extLst>
+          </p:cNvPr>
+          <p:cNvSpPr txBox="1"/>
+          <p:nvPr/>
+        </p:nvSpPr>
+        <p:spPr>
+          <a:xfrm>
+            <a:off x="4188823" y="2440412"/>
+            <a:ext cx="1628503" cy="338554"/>
+          </a:xfrm>
+          <a:prstGeom prst="rect">
+            <a:avLst/>
+          </a:prstGeom>
+          <a:solidFill>
+            <a:schemeClr val="bg1"/>
+          </a:solidFill>
+        </p:spPr>
+        <p:txBody>
+          <a:bodyPr wrap="square" rtlCol="0">
+            <a:spAutoFit/>
+          </a:bodyPr>
+          <a:lstStyle/>
+          <a:p>
+            <a:pPr algn="ctr"/>
+            <a:r>
+              <a:rPr lang="en-US" sz="1600" b="1" dirty="0"/>
+              <a:t>Good confidence</a:t>
+            </a:r>
+          </a:p>
+        </p:txBody>
+      </p:sp>
       <p:cxnSp>
         <p:nvCxnSpPr>
           <p:cNvPr id="31" name="Straight Arrow Connector 30">
@@ -4743,6 +4781,148 @@
           <a:xfrm>
             <a:off x="1837168" y="2010261"/>
             <a:ext cx="2836432" cy="478939"/>
+          </a:xfrm>
+          <a:prstGeom prst="straightConnector1">
+            <a:avLst/>
+          </a:prstGeom>
+          <a:ln w="38100">
+            <a:solidFill>
+              <a:schemeClr val="accent1"/>
+            </a:solidFill>
+            <a:tailEnd type="triangle"/>
+          </a:ln>
+        </p:spPr>
+        <p:style>
+          <a:lnRef idx="1">
+            <a:schemeClr val="accent1"/>
+          </a:lnRef>
+          <a:fillRef idx="0">
+            <a:schemeClr val="accent1"/>
+          </a:fillRef>
+          <a:effectRef idx="0">
+            <a:schemeClr val="accent1"/>
+          </a:effectRef>
+          <a:fontRef idx="minor">
+            <a:schemeClr val="tx1"/>
+          </a:fontRef>
+        </p:style>
+      </p:cxnSp>
+      <p:sp>
+        <p:nvSpPr>
+          <p:cNvPr id="7" name="TextBox 6">
+            <a:extLst>
+              <a:ext uri="{FF2B5EF4-FFF2-40B4-BE49-F238E27FC236}">
+                <a16:creationId xmlns:a16="http://schemas.microsoft.com/office/drawing/2014/main" id="{7AFD0261-8019-482C-8473-1902D21C509E}"/>
+              </a:ext>
+            </a:extLst>
+          </p:cNvPr>
+          <p:cNvSpPr txBox="1"/>
+          <p:nvPr/>
+        </p:nvSpPr>
+        <p:spPr>
+          <a:xfrm>
+            <a:off x="2269942" y="3554837"/>
+            <a:ext cx="1628503" cy="276999"/>
+          </a:xfrm>
+          <a:prstGeom prst="rect">
+            <a:avLst/>
+          </a:prstGeom>
+          <a:solidFill>
+            <a:schemeClr val="bg1"/>
+          </a:solidFill>
+          <a:ln w="38100">
+            <a:solidFill>
+              <a:schemeClr val="accent1"/>
+            </a:solidFill>
+          </a:ln>
+        </p:spPr>
+        <p:txBody>
+          <a:bodyPr wrap="square" rtlCol="0">
+            <a:spAutoFit/>
+          </a:bodyPr>
+          <a:lstStyle/>
+          <a:p>
+            <a:pPr algn="ctr"/>
+            <a:r>
+              <a:rPr lang="en-US" sz="1200" dirty="0"/>
+              <a:t>Robot starting location</a:t>
+            </a:r>
+          </a:p>
+        </p:txBody>
+      </p:sp>
+      <p:sp>
+        <p:nvSpPr>
+          <p:cNvPr id="8" name="Rectangle 7">
+            <a:extLst>
+              <a:ext uri="{FF2B5EF4-FFF2-40B4-BE49-F238E27FC236}">
+                <a16:creationId xmlns:a16="http://schemas.microsoft.com/office/drawing/2014/main" id="{ABAE6A45-F93A-4D37-A9FA-6815E77DA1D1}"/>
+              </a:ext>
+            </a:extLst>
+          </p:cNvPr>
+          <p:cNvSpPr/>
+          <p:nvPr/>
+        </p:nvSpPr>
+        <p:spPr>
+          <a:xfrm>
+            <a:off x="2181893" y="3117223"/>
+            <a:ext cx="223989" cy="215537"/>
+          </a:xfrm>
+          <a:prstGeom prst="rect">
+            <a:avLst/>
+          </a:prstGeom>
+          <a:solidFill>
+            <a:schemeClr val="bg1"/>
+          </a:solidFill>
+          <a:ln>
+            <a:solidFill>
+              <a:schemeClr val="bg1"/>
+            </a:solidFill>
+          </a:ln>
+        </p:spPr>
+        <p:style>
+          <a:lnRef idx="2">
+            <a:schemeClr val="accent1">
+              <a:shade val="50000"/>
+            </a:schemeClr>
+          </a:lnRef>
+          <a:fillRef idx="1">
+            <a:schemeClr val="accent1"/>
+          </a:fillRef>
+          <a:effectRef idx="0">
+            <a:schemeClr val="accent1"/>
+          </a:effectRef>
+          <a:fontRef idx="minor">
+            <a:schemeClr val="lt1"/>
+          </a:fontRef>
+        </p:style>
+        <p:txBody>
+          <a:bodyPr rtlCol="0" anchor="ctr"/>
+          <a:lstStyle/>
+          <a:p>
+            <a:pPr algn="ctr"/>
+            <a:endParaRPr lang="en-US"/>
+          </a:p>
+        </p:txBody>
+      </p:sp>
+      <p:cxnSp>
+        <p:nvCxnSpPr>
+          <p:cNvPr id="9" name="Straight Arrow Connector 8">
+            <a:extLst>
+              <a:ext uri="{FF2B5EF4-FFF2-40B4-BE49-F238E27FC236}">
+                <a16:creationId xmlns:a16="http://schemas.microsoft.com/office/drawing/2014/main" id="{439C3EF0-28D0-40CF-9AB6-B3C0714242C5}"/>
+              </a:ext>
+            </a:extLst>
+          </p:cNvPr>
+          <p:cNvCxnSpPr>
+            <a:cxnSpLocks/>
+            <a:stCxn id="7" idx="0"/>
+          </p:cNvCxnSpPr>
+          <p:nvPr/>
+        </p:nvCxnSpPr>
+        <p:spPr>
+          <a:xfrm flipH="1" flipV="1">
+            <a:off x="2269942" y="3202566"/>
+            <a:ext cx="814252" cy="352271"/>
           </a:xfrm>
           <a:prstGeom prst="straightConnector1">
             <a:avLst/>
@@ -4813,7 +4993,7 @@
           </p:cNvPicPr>
           <p:nvPr/>
         </p:nvPicPr>
-        <p:blipFill>
+        <p:blipFill rotWithShape="1">
           <a:blip r:embed="rId2">
             <a:extLst>
               <a:ext uri="{28A0092B-C50C-407E-A947-70E740481C1C}">
@@ -4821,14 +5001,13 @@
               </a:ext>
             </a:extLst>
           </a:blip>
-          <a:stretch>
-            <a:fillRect/>
-          </a:stretch>
+          <a:srcRect t="28643"/>
+          <a:stretch/>
         </p:blipFill>
         <p:spPr>
           <a:xfrm>
-            <a:off x="1638857" y="990905"/>
-            <a:ext cx="8914286" cy="4876190"/>
+            <a:off x="1638857" y="2387599"/>
+            <a:ext cx="8914286" cy="3479495"/>
           </a:xfrm>
           <a:prstGeom prst="rect">
             <a:avLst/>
@@ -4865,7 +5044,7 @@
           </a:ln>
         </p:spPr>
         <p:txBody>
-          <a:bodyPr wrap="none" rtlCol="0">
+          <a:bodyPr wrap="square" rtlCol="0">
             <a:spAutoFit/>
           </a:bodyPr>
           <a:lstStyle/>
@@ -4961,7 +5140,7 @@
           </a:ln>
         </p:spPr>
         <p:txBody>
-          <a:bodyPr wrap="none" rtlCol="0">
+          <a:bodyPr wrap="square" rtlCol="0">
             <a:spAutoFit/>
           </a:bodyPr>
           <a:lstStyle/>
@@ -4980,10 +5159,10 @@
       </p:sp>
       <p:cxnSp>
         <p:nvCxnSpPr>
-          <p:cNvPr id="12" name="Straight Arrow Connector 11">
-            <a:extLst>
-              <a:ext uri="{FF2B5EF4-FFF2-40B4-BE49-F238E27FC236}">
-                <a16:creationId xmlns:a16="http://schemas.microsoft.com/office/drawing/2014/main" id="{3410FB43-55B8-43D0-B13A-1E9E238C581D}"/>
+          <p:cNvPr id="15" name="Straight Arrow Connector 14">
+            <a:extLst>
+              <a:ext uri="{FF2B5EF4-FFF2-40B4-BE49-F238E27FC236}">
+                <a16:creationId xmlns:a16="http://schemas.microsoft.com/office/drawing/2014/main" id="{41B7CF3D-EDD9-4538-BA79-B210C2FD8FF7}"/>
               </a:ext>
             </a:extLst>
           </p:cNvPr>
@@ -4994,9 +5173,9 @@
           <p:nvPr/>
         </p:nvCxnSpPr>
         <p:spPr>
-          <a:xfrm flipH="1">
-            <a:off x="6042348" y="1999391"/>
-            <a:ext cx="2042194" cy="388209"/>
+          <a:xfrm>
+            <a:off x="8084542" y="1999391"/>
+            <a:ext cx="289403" cy="388209"/>
           </a:xfrm>
           <a:prstGeom prst="straightConnector1">
             <a:avLst/>
@@ -5025,10 +5204,93 @@
       </p:cxnSp>
       <p:cxnSp>
         <p:nvCxnSpPr>
-          <p:cNvPr id="15" name="Straight Arrow Connector 14">
-            <a:extLst>
-              <a:ext uri="{FF2B5EF4-FFF2-40B4-BE49-F238E27FC236}">
-                <a16:creationId xmlns:a16="http://schemas.microsoft.com/office/drawing/2014/main" id="{41B7CF3D-EDD9-4538-BA79-B210C2FD8FF7}"/>
+          <p:cNvPr id="20" name="Straight Arrow Connector 19">
+            <a:extLst>
+              <a:ext uri="{FF2B5EF4-FFF2-40B4-BE49-F238E27FC236}">
+                <a16:creationId xmlns:a16="http://schemas.microsoft.com/office/drawing/2014/main" id="{C4F99253-8C41-42F6-9FD6-CAA4A799B3F4}"/>
+              </a:ext>
+            </a:extLst>
+          </p:cNvPr>
+          <p:cNvCxnSpPr>
+            <a:cxnSpLocks/>
+            <a:stCxn id="18" idx="0"/>
+          </p:cNvCxnSpPr>
+          <p:nvPr/>
+        </p:nvCxnSpPr>
+        <p:spPr>
+          <a:xfrm flipH="1" flipV="1">
+            <a:off x="8373946" y="2908300"/>
+            <a:ext cx="853726" cy="609444"/>
+          </a:xfrm>
+          <a:prstGeom prst="straightConnector1">
+            <a:avLst/>
+          </a:prstGeom>
+          <a:ln w="38100">
+            <a:solidFill>
+              <a:schemeClr val="accent1"/>
+            </a:solidFill>
+            <a:tailEnd type="triangle"/>
+          </a:ln>
+        </p:spPr>
+        <p:style>
+          <a:lnRef idx="1">
+            <a:schemeClr val="accent1"/>
+          </a:lnRef>
+          <a:fillRef idx="0">
+            <a:schemeClr val="accent1"/>
+          </a:fillRef>
+          <a:effectRef idx="0">
+            <a:schemeClr val="accent1"/>
+          </a:effectRef>
+          <a:fontRef idx="minor">
+            <a:schemeClr val="tx1"/>
+          </a:fontRef>
+        </p:style>
+      </p:cxnSp>
+      <p:sp>
+        <p:nvSpPr>
+          <p:cNvPr id="23" name="TextBox 22">
+            <a:extLst>
+              <a:ext uri="{FF2B5EF4-FFF2-40B4-BE49-F238E27FC236}">
+                <a16:creationId xmlns:a16="http://schemas.microsoft.com/office/drawing/2014/main" id="{38DB3ADA-1EE6-4D33-86EE-4525986B4479}"/>
+              </a:ext>
+            </a:extLst>
+          </p:cNvPr>
+          <p:cNvSpPr txBox="1"/>
+          <p:nvPr/>
+        </p:nvSpPr>
+        <p:spPr>
+          <a:xfrm>
+            <a:off x="4705918" y="2310165"/>
+            <a:ext cx="1628503" cy="338554"/>
+          </a:xfrm>
+          <a:prstGeom prst="rect">
+            <a:avLst/>
+          </a:prstGeom>
+          <a:solidFill>
+            <a:schemeClr val="bg1"/>
+          </a:solidFill>
+        </p:spPr>
+        <p:txBody>
+          <a:bodyPr wrap="square" rtlCol="0">
+            <a:spAutoFit/>
+          </a:bodyPr>
+          <a:lstStyle/>
+          <a:p>
+            <a:pPr algn="ctr"/>
+            <a:r>
+              <a:rPr lang="en-US" sz="1600" b="1" dirty="0"/>
+              <a:t>Good confidence</a:t>
+            </a:r>
+          </a:p>
+        </p:txBody>
+      </p:sp>
+      <p:cxnSp>
+        <p:nvCxnSpPr>
+          <p:cNvPr id="12" name="Straight Arrow Connector 11">
+            <a:extLst>
+              <a:ext uri="{FF2B5EF4-FFF2-40B4-BE49-F238E27FC236}">
+                <a16:creationId xmlns:a16="http://schemas.microsoft.com/office/drawing/2014/main" id="{3410FB43-55B8-43D0-B13A-1E9E238C581D}"/>
               </a:ext>
             </a:extLst>
           </p:cNvPr>
@@ -5039,9 +5301,91 @@
           <p:nvPr/>
         </p:nvCxnSpPr>
         <p:spPr>
+          <a:xfrm flipH="1">
+            <a:off x="6042348" y="1999391"/>
+            <a:ext cx="2042194" cy="388209"/>
+          </a:xfrm>
+          <a:prstGeom prst="straightConnector1">
+            <a:avLst/>
+          </a:prstGeom>
+          <a:ln w="38100">
+            <a:solidFill>
+              <a:schemeClr val="accent1"/>
+            </a:solidFill>
+            <a:tailEnd type="triangle"/>
+          </a:ln>
+        </p:spPr>
+        <p:style>
+          <a:lnRef idx="1">
+            <a:schemeClr val="accent1"/>
+          </a:lnRef>
+          <a:fillRef idx="0">
+            <a:schemeClr val="accent1"/>
+          </a:fillRef>
+          <a:effectRef idx="0">
+            <a:schemeClr val="accent1"/>
+          </a:effectRef>
+          <a:fontRef idx="minor">
+            <a:schemeClr val="tx1"/>
+          </a:fontRef>
+        </p:style>
+      </p:cxnSp>
+      <p:sp>
+        <p:nvSpPr>
+          <p:cNvPr id="24" name="TextBox 23">
+            <a:extLst>
+              <a:ext uri="{FF2B5EF4-FFF2-40B4-BE49-F238E27FC236}">
+                <a16:creationId xmlns:a16="http://schemas.microsoft.com/office/drawing/2014/main" id="{67663FC5-7913-4986-96CC-4F28D5CDD7EE}"/>
+              </a:ext>
+            </a:extLst>
+          </p:cNvPr>
+          <p:cNvSpPr txBox="1"/>
+          <p:nvPr/>
+        </p:nvSpPr>
+        <p:spPr>
           <a:xfrm>
-            <a:off x="8084542" y="1999391"/>
-            <a:ext cx="289403" cy="388209"/>
+            <a:off x="9651649" y="2310165"/>
+            <a:ext cx="607047" cy="338554"/>
+          </a:xfrm>
+          <a:prstGeom prst="rect">
+            <a:avLst/>
+          </a:prstGeom>
+          <a:solidFill>
+            <a:schemeClr val="bg1"/>
+          </a:solidFill>
+        </p:spPr>
+        <p:txBody>
+          <a:bodyPr wrap="square" rtlCol="0">
+            <a:spAutoFit/>
+          </a:bodyPr>
+          <a:lstStyle/>
+          <a:p>
+            <a:pPr algn="ctr"/>
+            <a:r>
+              <a:rPr lang="en-US" sz="1600" b="1" dirty="0"/>
+              <a:t>fair</a:t>
+            </a:r>
+          </a:p>
+        </p:txBody>
+      </p:sp>
+      <p:cxnSp>
+        <p:nvCxnSpPr>
+          <p:cNvPr id="19" name="Straight Arrow Connector 18">
+            <a:extLst>
+              <a:ext uri="{FF2B5EF4-FFF2-40B4-BE49-F238E27FC236}">
+                <a16:creationId xmlns:a16="http://schemas.microsoft.com/office/drawing/2014/main" id="{62DDA714-3488-499B-A0B5-A777C92615EA}"/>
+              </a:ext>
+            </a:extLst>
+          </p:cNvPr>
+          <p:cNvCxnSpPr>
+            <a:cxnSpLocks/>
+          </p:cNvCxnSpPr>
+          <p:nvPr/>
+        </p:nvCxnSpPr>
+        <p:spPr>
+          <a:xfrm flipV="1">
+            <a:off x="9248503" y="2631301"/>
+            <a:ext cx="619397" cy="904379"/>
           </a:xfrm>
           <a:prstGeom prst="straightConnector1">
             <a:avLst/>
@@ -5115,69 +5459,122 @@
           </a:p>
         </p:txBody>
       </p:sp>
-      <p:cxnSp>
-        <p:nvCxnSpPr>
-          <p:cNvPr id="19" name="Straight Arrow Connector 18">
-            <a:extLst>
-              <a:ext uri="{FF2B5EF4-FFF2-40B4-BE49-F238E27FC236}">
-                <a16:creationId xmlns:a16="http://schemas.microsoft.com/office/drawing/2014/main" id="{62DDA714-3488-499B-A0B5-A777C92615EA}"/>
-              </a:ext>
-            </a:extLst>
-          </p:cNvPr>
-          <p:cNvCxnSpPr>
-            <a:cxnSpLocks/>
-          </p:cNvCxnSpPr>
+      <p:sp>
+        <p:nvSpPr>
+          <p:cNvPr id="25" name="TextBox 24">
+            <a:extLst>
+              <a:ext uri="{FF2B5EF4-FFF2-40B4-BE49-F238E27FC236}">
+                <a16:creationId xmlns:a16="http://schemas.microsoft.com/office/drawing/2014/main" id="{31FFD018-DBBF-4CE4-BBFE-AEE223A84D3F}"/>
+              </a:ext>
+            </a:extLst>
+          </p:cNvPr>
+          <p:cNvSpPr txBox="1"/>
           <p:nvPr/>
-        </p:nvCxnSpPr>
-        <p:spPr>
-          <a:xfrm flipV="1">
-            <a:off x="9326445" y="2631301"/>
-            <a:ext cx="541455" cy="830838"/>
-          </a:xfrm>
-          <a:prstGeom prst="straightConnector1">
+        </p:nvSpPr>
+        <p:spPr>
+          <a:xfrm>
+            <a:off x="3166933" y="3720308"/>
+            <a:ext cx="1628503" cy="276999"/>
+          </a:xfrm>
+          <a:prstGeom prst="rect">
             <a:avLst/>
           </a:prstGeom>
+          <a:solidFill>
+            <a:schemeClr val="bg1"/>
+          </a:solidFill>
           <a:ln w="38100">
             <a:solidFill>
               <a:schemeClr val="accent1"/>
             </a:solidFill>
-            <a:tailEnd type="triangle"/>
           </a:ln>
         </p:spPr>
+        <p:txBody>
+          <a:bodyPr wrap="square" rtlCol="0">
+            <a:spAutoFit/>
+          </a:bodyPr>
+          <a:lstStyle/>
+          <a:p>
+            <a:pPr algn="ctr"/>
+            <a:r>
+              <a:rPr lang="en-US" sz="1200" dirty="0"/>
+              <a:t>Robot starting location</a:t>
+            </a:r>
+          </a:p>
+        </p:txBody>
+      </p:sp>
+      <p:sp>
+        <p:nvSpPr>
+          <p:cNvPr id="9" name="Rectangle 8">
+            <a:extLst>
+              <a:ext uri="{FF2B5EF4-FFF2-40B4-BE49-F238E27FC236}">
+                <a16:creationId xmlns:a16="http://schemas.microsoft.com/office/drawing/2014/main" id="{6FDB1B7B-F8E2-436E-A195-AB61F9BEFE53}"/>
+              </a:ext>
+            </a:extLst>
+          </p:cNvPr>
+          <p:cNvSpPr/>
+          <p:nvPr/>
+        </p:nvSpPr>
+        <p:spPr>
+          <a:xfrm>
+            <a:off x="3070172" y="3265276"/>
+            <a:ext cx="223989" cy="215537"/>
+          </a:xfrm>
+          <a:prstGeom prst="rect">
+            <a:avLst/>
+          </a:prstGeom>
+          <a:solidFill>
+            <a:schemeClr val="bg1"/>
+          </a:solidFill>
+          <a:ln>
+            <a:solidFill>
+              <a:schemeClr val="bg1"/>
+            </a:solidFill>
+          </a:ln>
+        </p:spPr>
         <p:style>
-          <a:lnRef idx="1">
-            <a:schemeClr val="accent1"/>
+          <a:lnRef idx="2">
+            <a:schemeClr val="accent1">
+              <a:shade val="50000"/>
+            </a:schemeClr>
           </a:lnRef>
-          <a:fillRef idx="0">
+          <a:fillRef idx="1">
             <a:schemeClr val="accent1"/>
           </a:fillRef>
           <a:effectRef idx="0">
             <a:schemeClr val="accent1"/>
           </a:effectRef>
           <a:fontRef idx="minor">
-            <a:schemeClr val="tx1"/>
+            <a:schemeClr val="lt1"/>
           </a:fontRef>
         </p:style>
-      </p:cxnSp>
+        <p:txBody>
+          <a:bodyPr rtlCol="0" anchor="ctr"/>
+          <a:lstStyle/>
+          <a:p>
+            <a:pPr algn="ctr"/>
+            <a:endParaRPr lang="en-US"/>
+          </a:p>
+        </p:txBody>
+      </p:sp>
       <p:cxnSp>
         <p:nvCxnSpPr>
-          <p:cNvPr id="20" name="Straight Arrow Connector 19">
-            <a:extLst>
-              <a:ext uri="{FF2B5EF4-FFF2-40B4-BE49-F238E27FC236}">
-                <a16:creationId xmlns:a16="http://schemas.microsoft.com/office/drawing/2014/main" id="{C4F99253-8C41-42F6-9FD6-CAA4A799B3F4}"/>
+          <p:cNvPr id="26" name="Straight Arrow Connector 25">
+            <a:extLst>
+              <a:ext uri="{FF2B5EF4-FFF2-40B4-BE49-F238E27FC236}">
+                <a16:creationId xmlns:a16="http://schemas.microsoft.com/office/drawing/2014/main" id="{B6BB4417-48E8-4A77-B37E-CA596A1A9DE9}"/>
               </a:ext>
             </a:extLst>
           </p:cNvPr>
           <p:cNvCxnSpPr>
             <a:cxnSpLocks/>
-            <a:stCxn id="18" idx="0"/>
+            <a:stCxn id="25" idx="0"/>
           </p:cNvCxnSpPr>
           <p:nvPr/>
         </p:nvCxnSpPr>
         <p:spPr>
           <a:xfrm flipH="1" flipV="1">
-            <a:off x="8373946" y="2908300"/>
-            <a:ext cx="853726" cy="609444"/>
+            <a:off x="3166933" y="3368037"/>
+            <a:ext cx="814252" cy="352271"/>
           </a:xfrm>
           <a:prstGeom prst="straightConnector1">
             <a:avLst/>
@@ -5208,6 +5605,109 @@
     <p:extLst>
       <p:ext uri="{BB962C8B-B14F-4D97-AF65-F5344CB8AC3E}">
         <p14:creationId xmlns:p14="http://schemas.microsoft.com/office/powerpoint/2010/main" val="248722893"/>
+      </p:ext>
+    </p:extLst>
+  </p:cSld>
+  <p:clrMapOvr>
+    <a:masterClrMapping/>
+  </p:clrMapOvr>
+</p:sld>
+</file>
+
+<file path=ppt/slides/slide5.xml><?xml version="1.0" encoding="utf-8"?>
+<p:sld xmlns:a="http://schemas.openxmlformats.org/drawingml/2006/main" xmlns:r="http://schemas.openxmlformats.org/officeDocument/2006/relationships" xmlns:p="http://schemas.openxmlformats.org/presentationml/2006/main">
+  <p:cSld>
+    <p:spTree>
+      <p:nvGrpSpPr>
+        <p:cNvPr id="1" name=""/>
+        <p:cNvGrpSpPr/>
+        <p:nvPr/>
+      </p:nvGrpSpPr>
+      <p:grpSpPr>
+        <a:xfrm>
+          <a:off x="0" y="0"/>
+          <a:ext cx="0" cy="0"/>
+          <a:chOff x="0" y="0"/>
+          <a:chExt cx="0" cy="0"/>
+        </a:xfrm>
+      </p:grpSpPr>
+      <p:pic>
+        <p:nvPicPr>
+          <p:cNvPr id="5" name="Content Placeholder 4">
+            <a:extLst>
+              <a:ext uri="{FF2B5EF4-FFF2-40B4-BE49-F238E27FC236}">
+                <a16:creationId xmlns:a16="http://schemas.microsoft.com/office/drawing/2014/main" id="{98A3C82A-FED8-42CF-BAF6-1BA435A8E3BC}"/>
+              </a:ext>
+            </a:extLst>
+          </p:cNvPr>
+          <p:cNvPicPr>
+            <a:picLocks noGrp="1" noChangeAspect="1"/>
+          </p:cNvPicPr>
+          <p:nvPr>
+            <p:ph idx="1"/>
+          </p:nvPr>
+        </p:nvPicPr>
+        <p:blipFill>
+          <a:blip r:embed="rId2">
+            <a:extLst>
+              <a:ext uri="{28A0092B-C50C-407E-A947-70E740481C1C}">
+                <a14:useLocalDpi xmlns:a14="http://schemas.microsoft.com/office/drawing/2010/main" val="0"/>
+              </a:ext>
+            </a:extLst>
+          </a:blip>
+          <a:stretch>
+            <a:fillRect/>
+          </a:stretch>
+        </p:blipFill>
+        <p:spPr>
+          <a:xfrm>
+            <a:off x="2757905" y="2948913"/>
+            <a:ext cx="6676190" cy="2104762"/>
+          </a:xfrm>
+        </p:spPr>
+      </p:pic>
+      <p:sp>
+        <p:nvSpPr>
+          <p:cNvPr id="6" name="TextBox 5">
+            <a:extLst>
+              <a:ext uri="{FF2B5EF4-FFF2-40B4-BE49-F238E27FC236}">
+                <a16:creationId xmlns:a16="http://schemas.microsoft.com/office/drawing/2014/main" id="{6041B004-970C-410F-8B7D-714AFD6F9E02}"/>
+              </a:ext>
+            </a:extLst>
+          </p:cNvPr>
+          <p:cNvSpPr txBox="1"/>
+          <p:nvPr/>
+        </p:nvSpPr>
+        <p:spPr>
+          <a:xfrm>
+            <a:off x="4900155" y="3523411"/>
+            <a:ext cx="647205" cy="338554"/>
+          </a:xfrm>
+          <a:prstGeom prst="rect">
+            <a:avLst/>
+          </a:prstGeom>
+          <a:solidFill>
+            <a:schemeClr val="bg1"/>
+          </a:solidFill>
+        </p:spPr>
+        <p:txBody>
+          <a:bodyPr wrap="square" rtlCol="0">
+            <a:spAutoFit/>
+          </a:bodyPr>
+          <a:lstStyle/>
+          <a:p>
+            <a:pPr algn="ctr"/>
+            <a:r>
+              <a:rPr lang="en-US" sz="1600" b="1" dirty="0"/>
+              <a:t>good</a:t>
+            </a:r>
+          </a:p>
+        </p:txBody>
+      </p:sp>
+    </p:spTree>
+    <p:extLst>
+      <p:ext uri="{BB962C8B-B14F-4D97-AF65-F5344CB8AC3E}">
+        <p14:creationId xmlns:p14="http://schemas.microsoft.com/office/powerpoint/2010/main" val="3611421428"/>
       </p:ext>
     </p:extLst>
   </p:cSld>

</xml_diff>

<commit_message>
adding flow chart to ppt
</commit_message>
<xml_diff>
--- a/web_gridworld/admin/figures.pptx
+++ b/web_gridworld/admin/figures.pptx
@@ -10,6 +10,7 @@
     <p:sldId id="259" r:id="rId4"/>
     <p:sldId id="258" r:id="rId5"/>
     <p:sldId id="260" r:id="rId6"/>
+    <p:sldId id="261" r:id="rId7"/>
   </p:sldIdLst>
   <p:sldSz cx="12192000" cy="6858000"/>
   <p:notesSz cx="6858000" cy="9144000"/>
@@ -275,7 +276,7 @@
           <a:p>
             <a:fld id="{643F3906-2A15-4AA7-AE63-C2723486BB5A}" type="datetimeFigureOut">
               <a:rPr lang="en-US" smtClean="0"/>
-              <a:t>7/29/2021</a:t>
+              <a:t>7/31/2021</a:t>
             </a:fld>
             <a:endParaRPr lang="en-US"/>
           </a:p>
@@ -473,7 +474,7 @@
           <a:p>
             <a:fld id="{643F3906-2A15-4AA7-AE63-C2723486BB5A}" type="datetimeFigureOut">
               <a:rPr lang="en-US" smtClean="0"/>
-              <a:t>7/29/2021</a:t>
+              <a:t>7/31/2021</a:t>
             </a:fld>
             <a:endParaRPr lang="en-US"/>
           </a:p>
@@ -681,7 +682,7 @@
           <a:p>
             <a:fld id="{643F3906-2A15-4AA7-AE63-C2723486BB5A}" type="datetimeFigureOut">
               <a:rPr lang="en-US" smtClean="0"/>
-              <a:t>7/29/2021</a:t>
+              <a:t>7/31/2021</a:t>
             </a:fld>
             <a:endParaRPr lang="en-US"/>
           </a:p>
@@ -879,7 +880,7 @@
           <a:p>
             <a:fld id="{643F3906-2A15-4AA7-AE63-C2723486BB5A}" type="datetimeFigureOut">
               <a:rPr lang="en-US" smtClean="0"/>
-              <a:t>7/29/2021</a:t>
+              <a:t>7/31/2021</a:t>
             </a:fld>
             <a:endParaRPr lang="en-US"/>
           </a:p>
@@ -1154,7 +1155,7 @@
           <a:p>
             <a:fld id="{643F3906-2A15-4AA7-AE63-C2723486BB5A}" type="datetimeFigureOut">
               <a:rPr lang="en-US" smtClean="0"/>
-              <a:t>7/29/2021</a:t>
+              <a:t>7/31/2021</a:t>
             </a:fld>
             <a:endParaRPr lang="en-US"/>
           </a:p>
@@ -1419,7 +1420,7 @@
           <a:p>
             <a:fld id="{643F3906-2A15-4AA7-AE63-C2723486BB5A}" type="datetimeFigureOut">
               <a:rPr lang="en-US" smtClean="0"/>
-              <a:t>7/29/2021</a:t>
+              <a:t>7/31/2021</a:t>
             </a:fld>
             <a:endParaRPr lang="en-US"/>
           </a:p>
@@ -1831,7 +1832,7 @@
           <a:p>
             <a:fld id="{643F3906-2A15-4AA7-AE63-C2723486BB5A}" type="datetimeFigureOut">
               <a:rPr lang="en-US" smtClean="0"/>
-              <a:t>7/29/2021</a:t>
+              <a:t>7/31/2021</a:t>
             </a:fld>
             <a:endParaRPr lang="en-US"/>
           </a:p>
@@ -1972,7 +1973,7 @@
           <a:p>
             <a:fld id="{643F3906-2A15-4AA7-AE63-C2723486BB5A}" type="datetimeFigureOut">
               <a:rPr lang="en-US" smtClean="0"/>
-              <a:t>7/29/2021</a:t>
+              <a:t>7/31/2021</a:t>
             </a:fld>
             <a:endParaRPr lang="en-US"/>
           </a:p>
@@ -2085,7 +2086,7 @@
           <a:p>
             <a:fld id="{643F3906-2A15-4AA7-AE63-C2723486BB5A}" type="datetimeFigureOut">
               <a:rPr lang="en-US" smtClean="0"/>
-              <a:t>7/29/2021</a:t>
+              <a:t>7/31/2021</a:t>
             </a:fld>
             <a:endParaRPr lang="en-US"/>
           </a:p>
@@ -2396,7 +2397,7 @@
           <a:p>
             <a:fld id="{643F3906-2A15-4AA7-AE63-C2723486BB5A}" type="datetimeFigureOut">
               <a:rPr lang="en-US" smtClean="0"/>
-              <a:t>7/29/2021</a:t>
+              <a:t>7/31/2021</a:t>
             </a:fld>
             <a:endParaRPr lang="en-US"/>
           </a:p>
@@ -2684,7 +2685,7 @@
           <a:p>
             <a:fld id="{643F3906-2A15-4AA7-AE63-C2723486BB5A}" type="datetimeFigureOut">
               <a:rPr lang="en-US" smtClean="0"/>
-              <a:t>7/29/2021</a:t>
+              <a:t>7/31/2021</a:t>
             </a:fld>
             <a:endParaRPr lang="en-US"/>
           </a:p>
@@ -2925,7 +2926,7 @@
           <a:p>
             <a:fld id="{643F3906-2A15-4AA7-AE63-C2723486BB5A}" type="datetimeFigureOut">
               <a:rPr lang="en-US" smtClean="0"/>
-              <a:t>7/29/2021</a:t>
+              <a:t>7/31/2021</a:t>
             </a:fld>
             <a:endParaRPr lang="en-US"/>
           </a:p>
@@ -5717,6 +5718,2245 @@
 </p:sld>
 </file>
 
+<file path=ppt/slides/slide6.xml><?xml version="1.0" encoding="utf-8"?>
+<p:sld xmlns:a="http://schemas.openxmlformats.org/drawingml/2006/main" xmlns:r="http://schemas.openxmlformats.org/officeDocument/2006/relationships" xmlns:p="http://schemas.openxmlformats.org/presentationml/2006/main">
+  <p:cSld>
+    <p:spTree>
+      <p:nvGrpSpPr>
+        <p:cNvPr id="1" name=""/>
+        <p:cNvGrpSpPr/>
+        <p:nvPr/>
+      </p:nvGrpSpPr>
+      <p:grpSpPr>
+        <a:xfrm>
+          <a:off x="0" y="0"/>
+          <a:ext cx="0" cy="0"/>
+          <a:chOff x="0" y="0"/>
+          <a:chExt cx="0" cy="0"/>
+        </a:xfrm>
+      </p:grpSpPr>
+      <p:sp>
+        <p:nvSpPr>
+          <p:cNvPr id="4" name="Rectangle 3">
+            <a:extLst>
+              <a:ext uri="{FF2B5EF4-FFF2-40B4-BE49-F238E27FC236}">
+                <a16:creationId xmlns:a16="http://schemas.microsoft.com/office/drawing/2014/main" id="{B4BDA34A-3B22-4F2E-AB6E-E957F1E58E82}"/>
+              </a:ext>
+            </a:extLst>
+          </p:cNvPr>
+          <p:cNvSpPr/>
+          <p:nvPr/>
+        </p:nvSpPr>
+        <p:spPr>
+          <a:xfrm>
+            <a:off x="1984868" y="2593098"/>
+            <a:ext cx="973430" cy="321547"/>
+          </a:xfrm>
+          <a:prstGeom prst="rect">
+            <a:avLst/>
+          </a:prstGeom>
+          <a:solidFill>
+            <a:srgbClr val="4F81BD"/>
+          </a:solidFill>
+          <a:ln w="25400" cap="flat" cmpd="sng" algn="ctr">
+            <a:solidFill>
+              <a:srgbClr val="4F81BD">
+                <a:shade val="50000"/>
+              </a:srgbClr>
+            </a:solidFill>
+            <a:prstDash val="solid"/>
+          </a:ln>
+          <a:effectLst/>
+        </p:spPr>
+        <p:txBody>
+          <a:bodyPr rtlCol="0" anchor="ctr"/>
+          <a:lstStyle/>
+          <a:p>
+            <a:pPr marL="0" marR="0" lvl="0" indent="0" algn="ctr" defTabSz="914400" eaLnBrk="1" fontAlgn="auto" latinLnBrk="0" hangingPunct="1">
+              <a:lnSpc>
+                <a:spcPct val="100000"/>
+              </a:lnSpc>
+              <a:spcBef>
+                <a:spcPts val="0"/>
+              </a:spcBef>
+              <a:spcAft>
+                <a:spcPts val="0"/>
+              </a:spcAft>
+              <a:buClr>
+                <a:srgbClr val="000000"/>
+              </a:buClr>
+              <a:buSzTx/>
+              <a:buFont typeface="Arial"/>
+              <a:buNone/>
+              <a:tabLst/>
+              <a:defRPr/>
+            </a:pPr>
+            <a:r>
+              <a:rPr kumimoji="0" lang="en-US" sz="1400" b="0" i="0" u="none" strike="noStrike" kern="0" cap="none" spc="0" normalizeH="0" baseline="0" noProof="0" dirty="0">
+                <a:ln>
+                  <a:noFill/>
+                </a:ln>
+                <a:solidFill>
+                  <a:srgbClr val="FFFFFF"/>
+                </a:solidFill>
+                <a:effectLst/>
+                <a:uLnTx/>
+                <a:uFillTx/>
+                <a:latin typeface="Arial"/>
+                <a:ea typeface="+mn-ea"/>
+                <a:cs typeface="+mn-cs"/>
+                <a:sym typeface="Arial"/>
+              </a:rPr>
+              <a:t>Consent?</a:t>
+            </a:r>
+          </a:p>
+        </p:txBody>
+      </p:sp>
+      <p:sp>
+        <p:nvSpPr>
+          <p:cNvPr id="5" name="Rectangle 4">
+            <a:extLst>
+              <a:ext uri="{FF2B5EF4-FFF2-40B4-BE49-F238E27FC236}">
+                <a16:creationId xmlns:a16="http://schemas.microsoft.com/office/drawing/2014/main" id="{85D3E2ED-CE7C-49D5-8A16-E04ED13E42CE}"/>
+              </a:ext>
+            </a:extLst>
+          </p:cNvPr>
+          <p:cNvSpPr/>
+          <p:nvPr/>
+        </p:nvSpPr>
+        <p:spPr>
+          <a:xfrm>
+            <a:off x="4809664" y="2522715"/>
+            <a:ext cx="1457977" cy="462317"/>
+          </a:xfrm>
+          <a:prstGeom prst="rect">
+            <a:avLst/>
+          </a:prstGeom>
+          <a:solidFill>
+            <a:srgbClr val="4F81BD"/>
+          </a:solidFill>
+          <a:ln w="25400" cap="flat" cmpd="sng" algn="ctr">
+            <a:solidFill>
+              <a:srgbClr val="4F81BD">
+                <a:shade val="50000"/>
+              </a:srgbClr>
+            </a:solidFill>
+            <a:prstDash val="solid"/>
+          </a:ln>
+          <a:effectLst/>
+        </p:spPr>
+        <p:txBody>
+          <a:bodyPr rtlCol="0" anchor="ctr"/>
+          <a:lstStyle/>
+          <a:p>
+            <a:pPr marL="0" marR="0" lvl="0" indent="0" algn="ctr" defTabSz="914400" eaLnBrk="1" fontAlgn="auto" latinLnBrk="0" hangingPunct="1">
+              <a:lnSpc>
+                <a:spcPct val="100000"/>
+              </a:lnSpc>
+              <a:spcBef>
+                <a:spcPts val="0"/>
+              </a:spcBef>
+              <a:spcAft>
+                <a:spcPts val="0"/>
+              </a:spcAft>
+              <a:buClr>
+                <a:srgbClr val="000000"/>
+              </a:buClr>
+              <a:buSzTx/>
+              <a:buFont typeface="Arial"/>
+              <a:buNone/>
+              <a:tabLst/>
+              <a:defRPr/>
+            </a:pPr>
+            <a:r>
+              <a:rPr kumimoji="0" lang="en-US" sz="1400" b="0" i="0" u="none" strike="noStrike" kern="0" cap="none" spc="0" normalizeH="0" baseline="0" noProof="0" dirty="0">
+                <a:ln>
+                  <a:noFill/>
+                </a:ln>
+                <a:solidFill>
+                  <a:srgbClr val="FFFFFF"/>
+                </a:solidFill>
+                <a:effectLst/>
+                <a:uLnTx/>
+                <a:uFillTx/>
+                <a:latin typeface="Arial"/>
+                <a:ea typeface="+mn-ea"/>
+                <a:cs typeface="+mn-cs"/>
+                <a:sym typeface="Arial"/>
+              </a:rPr>
+              <a:t>Base Tutorial + quiz</a:t>
+            </a:r>
+          </a:p>
+        </p:txBody>
+      </p:sp>
+      <p:cxnSp>
+        <p:nvCxnSpPr>
+          <p:cNvPr id="6" name="Straight Arrow Connector 5">
+            <a:extLst>
+              <a:ext uri="{FF2B5EF4-FFF2-40B4-BE49-F238E27FC236}">
+                <a16:creationId xmlns:a16="http://schemas.microsoft.com/office/drawing/2014/main" id="{D78D95A5-D580-4AC7-938A-FF063A6FBB48}"/>
+              </a:ext>
+            </a:extLst>
+          </p:cNvPr>
+          <p:cNvCxnSpPr>
+            <a:cxnSpLocks/>
+            <a:stCxn id="4" idx="3"/>
+            <a:endCxn id="11" idx="1"/>
+          </p:cNvCxnSpPr>
+          <p:nvPr/>
+        </p:nvCxnSpPr>
+        <p:spPr>
+          <a:xfrm>
+            <a:off x="2958298" y="2753872"/>
+            <a:ext cx="409946" cy="0"/>
+          </a:xfrm>
+          <a:prstGeom prst="straightConnector1">
+            <a:avLst/>
+          </a:prstGeom>
+          <a:noFill/>
+          <a:ln w="9525" cap="flat" cmpd="sng" algn="ctr">
+            <a:solidFill>
+              <a:srgbClr val="4F81BD">
+                <a:shade val="95000"/>
+                <a:satMod val="105000"/>
+              </a:srgbClr>
+            </a:solidFill>
+            <a:prstDash val="solid"/>
+            <a:tailEnd type="triangle"/>
+          </a:ln>
+          <a:effectLst/>
+        </p:spPr>
+      </p:cxnSp>
+      <p:sp>
+        <p:nvSpPr>
+          <p:cNvPr id="7" name="Rectangle 6">
+            <a:extLst>
+              <a:ext uri="{FF2B5EF4-FFF2-40B4-BE49-F238E27FC236}">
+                <a16:creationId xmlns:a16="http://schemas.microsoft.com/office/drawing/2014/main" id="{FE3A37F0-8834-4F50-A8B9-911D7F1B3B78}"/>
+              </a:ext>
+            </a:extLst>
+          </p:cNvPr>
+          <p:cNvSpPr/>
+          <p:nvPr/>
+        </p:nvSpPr>
+        <p:spPr>
+          <a:xfrm>
+            <a:off x="6481735" y="2522715"/>
+            <a:ext cx="1277816" cy="462317"/>
+          </a:xfrm>
+          <a:prstGeom prst="rect">
+            <a:avLst/>
+          </a:prstGeom>
+          <a:solidFill>
+            <a:srgbClr val="4F81BD"/>
+          </a:solidFill>
+          <a:ln w="25400" cap="flat" cmpd="sng" algn="ctr">
+            <a:solidFill>
+              <a:srgbClr val="4F81BD">
+                <a:shade val="50000"/>
+              </a:srgbClr>
+            </a:solidFill>
+            <a:prstDash val="solid"/>
+          </a:ln>
+          <a:effectLst/>
+        </p:spPr>
+        <p:txBody>
+          <a:bodyPr rtlCol="0" anchor="ctr"/>
+          <a:lstStyle/>
+          <a:p>
+            <a:pPr marL="0" marR="0" lvl="0" indent="0" algn="ctr" defTabSz="914400" eaLnBrk="1" fontAlgn="auto" latinLnBrk="0" hangingPunct="1">
+              <a:lnSpc>
+                <a:spcPct val="100000"/>
+              </a:lnSpc>
+              <a:spcBef>
+                <a:spcPts val="0"/>
+              </a:spcBef>
+              <a:spcAft>
+                <a:spcPts val="0"/>
+              </a:spcAft>
+              <a:buClr>
+                <a:srgbClr val="000000"/>
+              </a:buClr>
+              <a:buSzTx/>
+              <a:buFont typeface="Arial"/>
+              <a:buNone/>
+              <a:tabLst/>
+              <a:defRPr/>
+            </a:pPr>
+            <a:r>
+              <a:rPr kumimoji="0" lang="en-US" sz="1400" b="0" i="0" u="none" strike="noStrike" kern="0" cap="none" spc="0" normalizeH="0" baseline="0" noProof="0" dirty="0">
+                <a:ln>
+                  <a:noFill/>
+                </a:ln>
+                <a:solidFill>
+                  <a:srgbClr val="FFFFFF"/>
+                </a:solidFill>
+                <a:effectLst/>
+                <a:uLnTx/>
+                <a:uFillTx/>
+                <a:latin typeface="Arial"/>
+                <a:ea typeface="+mn-ea"/>
+                <a:cs typeface="+mn-cs"/>
+                <a:sym typeface="Arial"/>
+              </a:rPr>
+              <a:t>Maze Set </a:t>
+            </a:r>
+            <a:r>
+              <a:rPr kumimoji="0" lang="en-US" sz="1400" b="0" i="1" u="none" strike="noStrike" kern="0" cap="none" spc="0" normalizeH="0" baseline="0" noProof="0" dirty="0" err="1">
+                <a:ln>
+                  <a:noFill/>
+                </a:ln>
+                <a:solidFill>
+                  <a:srgbClr val="FFFFFF"/>
+                </a:solidFill>
+                <a:effectLst/>
+                <a:uLnTx/>
+                <a:uFillTx/>
+                <a:latin typeface="Arial"/>
+                <a:ea typeface="+mn-ea"/>
+                <a:cs typeface="+mn-cs"/>
+                <a:sym typeface="Arial"/>
+              </a:rPr>
+              <a:t>i</a:t>
+            </a:r>
+            <a:r>
+              <a:rPr kumimoji="0" lang="en-US" sz="1400" b="0" i="0" u="none" strike="noStrike" kern="0" cap="none" spc="0" normalizeH="0" baseline="0" noProof="0" dirty="0">
+                <a:ln>
+                  <a:noFill/>
+                </a:ln>
+                <a:solidFill>
+                  <a:srgbClr val="FFFFFF"/>
+                </a:solidFill>
+                <a:effectLst/>
+                <a:uLnTx/>
+                <a:uFillTx/>
+                <a:latin typeface="Arial"/>
+                <a:ea typeface="+mn-ea"/>
+                <a:cs typeface="+mn-cs"/>
+                <a:sym typeface="Arial"/>
+              </a:rPr>
+              <a:t> tutorial + quiz</a:t>
+            </a:r>
+          </a:p>
+        </p:txBody>
+      </p:sp>
+      <p:cxnSp>
+        <p:nvCxnSpPr>
+          <p:cNvPr id="8" name="Straight Arrow Connector 7">
+            <a:extLst>
+              <a:ext uri="{FF2B5EF4-FFF2-40B4-BE49-F238E27FC236}">
+                <a16:creationId xmlns:a16="http://schemas.microsoft.com/office/drawing/2014/main" id="{4272B401-E732-4EF7-AFBC-00409EDA52D1}"/>
+              </a:ext>
+            </a:extLst>
+          </p:cNvPr>
+          <p:cNvCxnSpPr>
+            <a:cxnSpLocks/>
+            <a:stCxn id="5" idx="3"/>
+            <a:endCxn id="7" idx="1"/>
+          </p:cNvCxnSpPr>
+          <p:nvPr/>
+        </p:nvCxnSpPr>
+        <p:spPr>
+          <a:xfrm>
+            <a:off x="6267641" y="2753874"/>
+            <a:ext cx="214094" cy="0"/>
+          </a:xfrm>
+          <a:prstGeom prst="straightConnector1">
+            <a:avLst/>
+          </a:prstGeom>
+          <a:noFill/>
+          <a:ln w="9525" cap="flat" cmpd="sng" algn="ctr">
+            <a:solidFill>
+              <a:srgbClr val="4F81BD">
+                <a:shade val="95000"/>
+                <a:satMod val="105000"/>
+              </a:srgbClr>
+            </a:solidFill>
+            <a:prstDash val="solid"/>
+            <a:tailEnd type="triangle"/>
+          </a:ln>
+          <a:effectLst/>
+        </p:spPr>
+      </p:cxnSp>
+      <p:cxnSp>
+        <p:nvCxnSpPr>
+          <p:cNvPr id="9" name="Straight Arrow Connector 8">
+            <a:extLst>
+              <a:ext uri="{FF2B5EF4-FFF2-40B4-BE49-F238E27FC236}">
+                <a16:creationId xmlns:a16="http://schemas.microsoft.com/office/drawing/2014/main" id="{624F4099-1D42-4A12-884B-195670A053C9}"/>
+              </a:ext>
+            </a:extLst>
+          </p:cNvPr>
+          <p:cNvCxnSpPr>
+            <a:cxnSpLocks/>
+            <a:stCxn id="4" idx="0"/>
+            <a:endCxn id="10" idx="2"/>
+          </p:cNvCxnSpPr>
+          <p:nvPr/>
+        </p:nvCxnSpPr>
+        <p:spPr>
+          <a:xfrm flipV="1">
+            <a:off x="2471583" y="2271504"/>
+            <a:ext cx="0" cy="321594"/>
+          </a:xfrm>
+          <a:prstGeom prst="straightConnector1">
+            <a:avLst/>
+          </a:prstGeom>
+          <a:noFill/>
+          <a:ln w="9525" cap="flat" cmpd="sng" algn="ctr">
+            <a:solidFill>
+              <a:srgbClr val="4F81BD">
+                <a:shade val="95000"/>
+                <a:satMod val="105000"/>
+              </a:srgbClr>
+            </a:solidFill>
+            <a:prstDash val="solid"/>
+            <a:tailEnd type="triangle"/>
+          </a:ln>
+          <a:effectLst/>
+        </p:spPr>
+      </p:cxnSp>
+      <p:sp>
+        <p:nvSpPr>
+          <p:cNvPr id="10" name="Rectangle 9">
+            <a:extLst>
+              <a:ext uri="{FF2B5EF4-FFF2-40B4-BE49-F238E27FC236}">
+                <a16:creationId xmlns:a16="http://schemas.microsoft.com/office/drawing/2014/main" id="{43FAA592-2D25-475A-8573-C80AADF7C72B}"/>
+              </a:ext>
+            </a:extLst>
+          </p:cNvPr>
+          <p:cNvSpPr/>
+          <p:nvPr/>
+        </p:nvSpPr>
+        <p:spPr>
+          <a:xfrm>
+            <a:off x="1930232" y="1809187"/>
+            <a:ext cx="1082702" cy="462317"/>
+          </a:xfrm>
+          <a:prstGeom prst="rect">
+            <a:avLst/>
+          </a:prstGeom>
+          <a:solidFill>
+            <a:srgbClr val="4F81BD"/>
+          </a:solidFill>
+          <a:ln w="25400" cap="flat" cmpd="sng" algn="ctr">
+            <a:solidFill>
+              <a:srgbClr val="4F81BD">
+                <a:shade val="50000"/>
+              </a:srgbClr>
+            </a:solidFill>
+            <a:prstDash val="solid"/>
+          </a:ln>
+          <a:effectLst/>
+        </p:spPr>
+        <p:txBody>
+          <a:bodyPr rtlCol="0" anchor="ctr"/>
+          <a:lstStyle/>
+          <a:p>
+            <a:pPr marL="0" marR="0" lvl="0" indent="0" algn="ctr" defTabSz="914400" eaLnBrk="1" fontAlgn="auto" latinLnBrk="0" hangingPunct="1">
+              <a:lnSpc>
+                <a:spcPct val="100000"/>
+              </a:lnSpc>
+              <a:spcBef>
+                <a:spcPts val="0"/>
+              </a:spcBef>
+              <a:spcAft>
+                <a:spcPts val="0"/>
+              </a:spcAft>
+              <a:buClr>
+                <a:srgbClr val="000000"/>
+              </a:buClr>
+              <a:buSzTx/>
+              <a:buFont typeface="Arial"/>
+              <a:buNone/>
+              <a:tabLst/>
+              <a:defRPr/>
+            </a:pPr>
+            <a:r>
+              <a:rPr kumimoji="0" lang="en-US" sz="1400" b="0" i="0" u="none" strike="noStrike" kern="0" cap="none" spc="0" normalizeH="0" baseline="0" noProof="0" dirty="0">
+                <a:ln>
+                  <a:noFill/>
+                </a:ln>
+                <a:solidFill>
+                  <a:srgbClr val="FFFFFF"/>
+                </a:solidFill>
+                <a:effectLst/>
+                <a:uLnTx/>
+                <a:uFillTx/>
+                <a:latin typeface="Arial"/>
+                <a:ea typeface="+mn-ea"/>
+                <a:cs typeface="+mn-cs"/>
+                <a:sym typeface="Arial"/>
+              </a:rPr>
+              <a:t>Thank you screen</a:t>
+            </a:r>
+          </a:p>
+        </p:txBody>
+      </p:sp>
+      <p:sp>
+        <p:nvSpPr>
+          <p:cNvPr id="11" name="Rectangle 10">
+            <a:extLst>
+              <a:ext uri="{FF2B5EF4-FFF2-40B4-BE49-F238E27FC236}">
+                <a16:creationId xmlns:a16="http://schemas.microsoft.com/office/drawing/2014/main" id="{25545B59-0283-4950-AA42-871EAE5E4FD1}"/>
+              </a:ext>
+            </a:extLst>
+          </p:cNvPr>
+          <p:cNvSpPr/>
+          <p:nvPr/>
+        </p:nvSpPr>
+        <p:spPr>
+          <a:xfrm>
+            <a:off x="3368244" y="2522713"/>
+            <a:ext cx="970554" cy="462317"/>
+          </a:xfrm>
+          <a:prstGeom prst="rect">
+            <a:avLst/>
+          </a:prstGeom>
+          <a:solidFill>
+            <a:srgbClr val="4F81BD"/>
+          </a:solidFill>
+          <a:ln w="25400" cap="flat" cmpd="sng" algn="ctr">
+            <a:solidFill>
+              <a:srgbClr val="4F81BD">
+                <a:shade val="50000"/>
+              </a:srgbClr>
+            </a:solidFill>
+            <a:prstDash val="solid"/>
+          </a:ln>
+          <a:effectLst/>
+        </p:spPr>
+        <p:txBody>
+          <a:bodyPr rtlCol="0" anchor="ctr"/>
+          <a:lstStyle/>
+          <a:p>
+            <a:pPr marL="0" marR="0" lvl="0" indent="0" algn="ctr" defTabSz="914400" eaLnBrk="1" fontAlgn="auto" latinLnBrk="0" hangingPunct="1">
+              <a:lnSpc>
+                <a:spcPct val="100000"/>
+              </a:lnSpc>
+              <a:spcBef>
+                <a:spcPts val="0"/>
+              </a:spcBef>
+              <a:spcAft>
+                <a:spcPts val="0"/>
+              </a:spcAft>
+              <a:buClr>
+                <a:srgbClr val="000000"/>
+              </a:buClr>
+              <a:buSzTx/>
+              <a:buFont typeface="Arial"/>
+              <a:buNone/>
+              <a:tabLst/>
+              <a:defRPr/>
+            </a:pPr>
+            <a:r>
+              <a:rPr kumimoji="0" lang="en-US" sz="1400" b="0" i="0" u="none" strike="noStrike" kern="0" cap="none" spc="0" normalizeH="0" baseline="0" noProof="0" dirty="0">
+                <a:ln>
+                  <a:noFill/>
+                </a:ln>
+                <a:solidFill>
+                  <a:srgbClr val="FFFFFF"/>
+                </a:solidFill>
+                <a:effectLst/>
+                <a:uLnTx/>
+                <a:uFillTx/>
+                <a:latin typeface="Arial"/>
+                <a:ea typeface="+mn-ea"/>
+                <a:cs typeface="+mn-cs"/>
+                <a:sym typeface="Arial"/>
+              </a:rPr>
+              <a:t>Pass Pre-screen?</a:t>
+            </a:r>
+          </a:p>
+        </p:txBody>
+      </p:sp>
+      <p:cxnSp>
+        <p:nvCxnSpPr>
+          <p:cNvPr id="12" name="Straight Arrow Connector 11">
+            <a:extLst>
+              <a:ext uri="{FF2B5EF4-FFF2-40B4-BE49-F238E27FC236}">
+                <a16:creationId xmlns:a16="http://schemas.microsoft.com/office/drawing/2014/main" id="{D16A4078-C66D-4709-B0BE-9FA3449B642B}"/>
+              </a:ext>
+            </a:extLst>
+          </p:cNvPr>
+          <p:cNvCxnSpPr>
+            <a:cxnSpLocks/>
+            <a:stCxn id="11" idx="3"/>
+            <a:endCxn id="5" idx="1"/>
+          </p:cNvCxnSpPr>
+          <p:nvPr/>
+        </p:nvCxnSpPr>
+        <p:spPr>
+          <a:xfrm>
+            <a:off x="4338798" y="2753872"/>
+            <a:ext cx="470866" cy="2"/>
+          </a:xfrm>
+          <a:prstGeom prst="straightConnector1">
+            <a:avLst/>
+          </a:prstGeom>
+          <a:noFill/>
+          <a:ln w="9525" cap="flat" cmpd="sng" algn="ctr">
+            <a:solidFill>
+              <a:srgbClr val="4F81BD">
+                <a:shade val="95000"/>
+                <a:satMod val="105000"/>
+              </a:srgbClr>
+            </a:solidFill>
+            <a:prstDash val="solid"/>
+            <a:tailEnd type="triangle"/>
+          </a:ln>
+          <a:effectLst/>
+        </p:spPr>
+      </p:cxnSp>
+      <p:cxnSp>
+        <p:nvCxnSpPr>
+          <p:cNvPr id="13" name="Connector: Elbow 12">
+            <a:extLst>
+              <a:ext uri="{FF2B5EF4-FFF2-40B4-BE49-F238E27FC236}">
+                <a16:creationId xmlns:a16="http://schemas.microsoft.com/office/drawing/2014/main" id="{3145C439-F29D-4210-AB77-854C60DA98E0}"/>
+              </a:ext>
+            </a:extLst>
+          </p:cNvPr>
+          <p:cNvCxnSpPr>
+            <a:cxnSpLocks/>
+            <a:stCxn id="11" idx="0"/>
+            <a:endCxn id="10" idx="3"/>
+          </p:cNvCxnSpPr>
+          <p:nvPr/>
+        </p:nvCxnSpPr>
+        <p:spPr>
+          <a:xfrm rot="16200000" flipV="1">
+            <a:off x="3192045" y="1861236"/>
+            <a:ext cx="482367" cy="840587"/>
+          </a:xfrm>
+          <a:prstGeom prst="bentConnector2">
+            <a:avLst/>
+          </a:prstGeom>
+          <a:noFill/>
+          <a:ln w="9525" cap="flat" cmpd="sng" algn="ctr">
+            <a:solidFill>
+              <a:srgbClr val="4F81BD">
+                <a:shade val="95000"/>
+                <a:satMod val="105000"/>
+              </a:srgbClr>
+            </a:solidFill>
+            <a:prstDash val="solid"/>
+            <a:tailEnd type="triangle"/>
+          </a:ln>
+          <a:effectLst/>
+        </p:spPr>
+      </p:cxnSp>
+      <p:sp>
+        <p:nvSpPr>
+          <p:cNvPr id="14" name="Rectangle 13">
+            <a:extLst>
+              <a:ext uri="{FF2B5EF4-FFF2-40B4-BE49-F238E27FC236}">
+                <a16:creationId xmlns:a16="http://schemas.microsoft.com/office/drawing/2014/main" id="{7FA43DDC-A09F-48F7-B86A-7061E67EB691}"/>
+              </a:ext>
+            </a:extLst>
+          </p:cNvPr>
+          <p:cNvSpPr/>
+          <p:nvPr/>
+        </p:nvSpPr>
+        <p:spPr>
+          <a:xfrm>
+            <a:off x="8115301" y="754207"/>
+            <a:ext cx="1082702" cy="462317"/>
+          </a:xfrm>
+          <a:prstGeom prst="rect">
+            <a:avLst/>
+          </a:prstGeom>
+          <a:solidFill>
+            <a:srgbClr val="4F81BD"/>
+          </a:solidFill>
+          <a:ln w="25400" cap="flat" cmpd="sng" algn="ctr">
+            <a:solidFill>
+              <a:srgbClr val="4F81BD">
+                <a:shade val="50000"/>
+              </a:srgbClr>
+            </a:solidFill>
+            <a:prstDash val="solid"/>
+          </a:ln>
+          <a:effectLst/>
+        </p:spPr>
+        <p:txBody>
+          <a:bodyPr rtlCol="0" anchor="ctr"/>
+          <a:lstStyle/>
+          <a:p>
+            <a:pPr marL="0" marR="0" lvl="0" indent="0" algn="ctr" defTabSz="914400" eaLnBrk="1" fontAlgn="auto" latinLnBrk="0" hangingPunct="1">
+              <a:lnSpc>
+                <a:spcPct val="100000"/>
+              </a:lnSpc>
+              <a:spcBef>
+                <a:spcPts val="0"/>
+              </a:spcBef>
+              <a:spcAft>
+                <a:spcPts val="0"/>
+              </a:spcAft>
+              <a:buClr>
+                <a:srgbClr val="000000"/>
+              </a:buClr>
+              <a:buSzTx/>
+              <a:buFont typeface="Arial"/>
+              <a:buNone/>
+              <a:tabLst/>
+              <a:defRPr/>
+            </a:pPr>
+            <a:r>
+              <a:rPr kumimoji="0" lang="en-US" sz="1400" b="0" i="0" u="none" strike="noStrike" kern="0" cap="none" spc="0" normalizeH="0" baseline="0" noProof="0" dirty="0">
+                <a:ln>
+                  <a:noFill/>
+                </a:ln>
+                <a:solidFill>
+                  <a:srgbClr val="FFFFFF"/>
+                </a:solidFill>
+                <a:effectLst/>
+                <a:uLnTx/>
+                <a:uFillTx/>
+                <a:latin typeface="Arial"/>
+                <a:ea typeface="+mn-ea"/>
+                <a:cs typeface="+mn-cs"/>
+                <a:sym typeface="Arial"/>
+              </a:rPr>
+              <a:t>Maze Set </a:t>
+            </a:r>
+            <a:r>
+              <a:rPr kumimoji="0" lang="en-US" sz="1400" b="0" i="1" u="none" strike="noStrike" kern="0" cap="none" spc="0" normalizeH="0" baseline="0" noProof="0" dirty="0" err="1">
+                <a:ln>
+                  <a:noFill/>
+                </a:ln>
+                <a:solidFill>
+                  <a:srgbClr val="FFFFFF"/>
+                </a:solidFill>
+                <a:effectLst/>
+                <a:uLnTx/>
+                <a:uFillTx/>
+                <a:latin typeface="Arial"/>
+                <a:ea typeface="+mn-ea"/>
+                <a:cs typeface="+mn-cs"/>
+                <a:sym typeface="Arial"/>
+              </a:rPr>
+              <a:t>i</a:t>
+            </a:r>
+            <a:r>
+              <a:rPr kumimoji="0" lang="en-US" sz="1400" b="0" i="0" u="none" strike="noStrike" kern="0" cap="none" spc="0" normalizeH="0" baseline="0" noProof="0" dirty="0">
+                <a:ln>
+                  <a:noFill/>
+                </a:ln>
+                <a:solidFill>
+                  <a:srgbClr val="FFFFFF"/>
+                </a:solidFill>
+                <a:effectLst/>
+                <a:uLnTx/>
+                <a:uFillTx/>
+                <a:latin typeface="Arial"/>
+                <a:ea typeface="+mn-ea"/>
+                <a:cs typeface="+mn-cs"/>
+                <a:sym typeface="Arial"/>
+              </a:rPr>
+              <a:t> maze 1</a:t>
+            </a:r>
+          </a:p>
+        </p:txBody>
+      </p:sp>
+      <p:sp>
+        <p:nvSpPr>
+          <p:cNvPr id="15" name="Rectangle 14">
+            <a:extLst>
+              <a:ext uri="{FF2B5EF4-FFF2-40B4-BE49-F238E27FC236}">
+                <a16:creationId xmlns:a16="http://schemas.microsoft.com/office/drawing/2014/main" id="{DDCD3927-9EE6-4531-98CE-42F6E5ABEAD7}"/>
+              </a:ext>
+            </a:extLst>
+          </p:cNvPr>
+          <p:cNvSpPr/>
+          <p:nvPr/>
+        </p:nvSpPr>
+        <p:spPr>
+          <a:xfrm>
+            <a:off x="8115301" y="1397305"/>
+            <a:ext cx="1082702" cy="462317"/>
+          </a:xfrm>
+          <a:prstGeom prst="rect">
+            <a:avLst/>
+          </a:prstGeom>
+          <a:solidFill>
+            <a:srgbClr val="4F81BD"/>
+          </a:solidFill>
+          <a:ln w="25400" cap="flat" cmpd="sng" algn="ctr">
+            <a:solidFill>
+              <a:srgbClr val="4F81BD">
+                <a:shade val="50000"/>
+              </a:srgbClr>
+            </a:solidFill>
+            <a:prstDash val="solid"/>
+          </a:ln>
+          <a:effectLst/>
+        </p:spPr>
+        <p:txBody>
+          <a:bodyPr rtlCol="0" anchor="ctr"/>
+          <a:lstStyle/>
+          <a:p>
+            <a:pPr marL="0" marR="0" lvl="0" indent="0" algn="ctr" defTabSz="914400" eaLnBrk="1" fontAlgn="auto" latinLnBrk="0" hangingPunct="1">
+              <a:lnSpc>
+                <a:spcPct val="100000"/>
+              </a:lnSpc>
+              <a:spcBef>
+                <a:spcPts val="0"/>
+              </a:spcBef>
+              <a:spcAft>
+                <a:spcPts val="0"/>
+              </a:spcAft>
+              <a:buClr>
+                <a:srgbClr val="000000"/>
+              </a:buClr>
+              <a:buSzTx/>
+              <a:buFont typeface="Arial"/>
+              <a:buNone/>
+              <a:tabLst/>
+              <a:defRPr/>
+            </a:pPr>
+            <a:r>
+              <a:rPr kumimoji="0" lang="en-US" sz="1400" b="0" i="0" u="none" strike="noStrike" kern="0" cap="none" spc="0" normalizeH="0" baseline="0" noProof="0" dirty="0">
+                <a:ln>
+                  <a:noFill/>
+                </a:ln>
+                <a:solidFill>
+                  <a:srgbClr val="FFFFFF"/>
+                </a:solidFill>
+                <a:effectLst/>
+                <a:uLnTx/>
+                <a:uFillTx/>
+                <a:latin typeface="Arial"/>
+                <a:ea typeface="+mn-ea"/>
+                <a:cs typeface="+mn-cs"/>
+                <a:sym typeface="Arial"/>
+              </a:rPr>
+              <a:t>Maze Set </a:t>
+            </a:r>
+            <a:r>
+              <a:rPr kumimoji="0" lang="en-US" sz="1400" b="0" i="1" u="none" strike="noStrike" kern="0" cap="none" spc="0" normalizeH="0" baseline="0" noProof="0" dirty="0" err="1">
+                <a:ln>
+                  <a:noFill/>
+                </a:ln>
+                <a:solidFill>
+                  <a:srgbClr val="FFFFFF"/>
+                </a:solidFill>
+                <a:effectLst/>
+                <a:uLnTx/>
+                <a:uFillTx/>
+                <a:latin typeface="Arial"/>
+                <a:ea typeface="+mn-ea"/>
+                <a:cs typeface="+mn-cs"/>
+                <a:sym typeface="Arial"/>
+              </a:rPr>
+              <a:t>i</a:t>
+            </a:r>
+            <a:r>
+              <a:rPr kumimoji="0" lang="en-US" sz="1400" b="0" i="0" u="none" strike="noStrike" kern="0" cap="none" spc="0" normalizeH="0" baseline="0" noProof="0" dirty="0">
+                <a:ln>
+                  <a:noFill/>
+                </a:ln>
+                <a:solidFill>
+                  <a:srgbClr val="FFFFFF"/>
+                </a:solidFill>
+                <a:effectLst/>
+                <a:uLnTx/>
+                <a:uFillTx/>
+                <a:latin typeface="Arial"/>
+                <a:ea typeface="+mn-ea"/>
+                <a:cs typeface="+mn-cs"/>
+                <a:sym typeface="Arial"/>
+              </a:rPr>
+              <a:t> maze 2</a:t>
+            </a:r>
+          </a:p>
+        </p:txBody>
+      </p:sp>
+      <p:sp>
+        <p:nvSpPr>
+          <p:cNvPr id="16" name="Rectangle 15">
+            <a:extLst>
+              <a:ext uri="{FF2B5EF4-FFF2-40B4-BE49-F238E27FC236}">
+                <a16:creationId xmlns:a16="http://schemas.microsoft.com/office/drawing/2014/main" id="{C2B9471E-B1EC-49D4-8566-07296C1C7440}"/>
+              </a:ext>
+            </a:extLst>
+          </p:cNvPr>
+          <p:cNvSpPr/>
+          <p:nvPr/>
+        </p:nvSpPr>
+        <p:spPr>
+          <a:xfrm>
+            <a:off x="8115301" y="2040403"/>
+            <a:ext cx="1082702" cy="462317"/>
+          </a:xfrm>
+          <a:prstGeom prst="rect">
+            <a:avLst/>
+          </a:prstGeom>
+          <a:solidFill>
+            <a:srgbClr val="4F81BD"/>
+          </a:solidFill>
+          <a:ln w="25400" cap="flat" cmpd="sng" algn="ctr">
+            <a:solidFill>
+              <a:srgbClr val="4F81BD">
+                <a:shade val="50000"/>
+              </a:srgbClr>
+            </a:solidFill>
+            <a:prstDash val="solid"/>
+          </a:ln>
+          <a:effectLst/>
+        </p:spPr>
+        <p:txBody>
+          <a:bodyPr rtlCol="0" anchor="ctr"/>
+          <a:lstStyle/>
+          <a:p>
+            <a:pPr marL="0" marR="0" lvl="0" indent="0" algn="ctr" defTabSz="914400" eaLnBrk="1" fontAlgn="auto" latinLnBrk="0" hangingPunct="1">
+              <a:lnSpc>
+                <a:spcPct val="100000"/>
+              </a:lnSpc>
+              <a:spcBef>
+                <a:spcPts val="0"/>
+              </a:spcBef>
+              <a:spcAft>
+                <a:spcPts val="0"/>
+              </a:spcAft>
+              <a:buClr>
+                <a:srgbClr val="000000"/>
+              </a:buClr>
+              <a:buSzTx/>
+              <a:buFont typeface="Arial"/>
+              <a:buNone/>
+              <a:tabLst/>
+              <a:defRPr/>
+            </a:pPr>
+            <a:r>
+              <a:rPr kumimoji="0" lang="en-US" sz="1400" b="0" i="0" u="none" strike="noStrike" kern="0" cap="none" spc="0" normalizeH="0" baseline="0" noProof="0" dirty="0">
+                <a:ln>
+                  <a:noFill/>
+                </a:ln>
+                <a:solidFill>
+                  <a:srgbClr val="FFFFFF"/>
+                </a:solidFill>
+                <a:effectLst/>
+                <a:uLnTx/>
+                <a:uFillTx/>
+                <a:latin typeface="Arial"/>
+                <a:ea typeface="+mn-ea"/>
+                <a:cs typeface="+mn-cs"/>
+                <a:sym typeface="Arial"/>
+              </a:rPr>
+              <a:t>Maze Set </a:t>
+            </a:r>
+            <a:r>
+              <a:rPr kumimoji="0" lang="en-US" sz="1400" b="0" i="1" u="none" strike="noStrike" kern="0" cap="none" spc="0" normalizeH="0" baseline="0" noProof="0" dirty="0" err="1">
+                <a:ln>
+                  <a:noFill/>
+                </a:ln>
+                <a:solidFill>
+                  <a:srgbClr val="FFFFFF"/>
+                </a:solidFill>
+                <a:effectLst/>
+                <a:uLnTx/>
+                <a:uFillTx/>
+                <a:latin typeface="Arial"/>
+                <a:ea typeface="+mn-ea"/>
+                <a:cs typeface="+mn-cs"/>
+                <a:sym typeface="Arial"/>
+              </a:rPr>
+              <a:t>i</a:t>
+            </a:r>
+            <a:r>
+              <a:rPr kumimoji="0" lang="en-US" sz="1400" b="0" i="0" u="none" strike="noStrike" kern="0" cap="none" spc="0" normalizeH="0" baseline="0" noProof="0" dirty="0">
+                <a:ln>
+                  <a:noFill/>
+                </a:ln>
+                <a:solidFill>
+                  <a:srgbClr val="FFFFFF"/>
+                </a:solidFill>
+                <a:effectLst/>
+                <a:uLnTx/>
+                <a:uFillTx/>
+                <a:latin typeface="Arial"/>
+                <a:ea typeface="+mn-ea"/>
+                <a:cs typeface="+mn-cs"/>
+                <a:sym typeface="Arial"/>
+              </a:rPr>
+              <a:t> maze 3</a:t>
+            </a:r>
+          </a:p>
+        </p:txBody>
+      </p:sp>
+      <p:sp>
+        <p:nvSpPr>
+          <p:cNvPr id="17" name="Rectangle 16">
+            <a:extLst>
+              <a:ext uri="{FF2B5EF4-FFF2-40B4-BE49-F238E27FC236}">
+                <a16:creationId xmlns:a16="http://schemas.microsoft.com/office/drawing/2014/main" id="{1C599EC5-B847-453D-9B33-BE6F457AEB08}"/>
+              </a:ext>
+            </a:extLst>
+          </p:cNvPr>
+          <p:cNvSpPr/>
+          <p:nvPr/>
+        </p:nvSpPr>
+        <p:spPr>
+          <a:xfrm>
+            <a:off x="8115301" y="2683501"/>
+            <a:ext cx="1082702" cy="462317"/>
+          </a:xfrm>
+          <a:prstGeom prst="rect">
+            <a:avLst/>
+          </a:prstGeom>
+          <a:solidFill>
+            <a:srgbClr val="4F81BD"/>
+          </a:solidFill>
+          <a:ln w="25400" cap="flat" cmpd="sng" algn="ctr">
+            <a:solidFill>
+              <a:srgbClr val="4F81BD">
+                <a:shade val="50000"/>
+              </a:srgbClr>
+            </a:solidFill>
+            <a:prstDash val="solid"/>
+          </a:ln>
+          <a:effectLst/>
+        </p:spPr>
+        <p:txBody>
+          <a:bodyPr rtlCol="0" anchor="ctr"/>
+          <a:lstStyle/>
+          <a:p>
+            <a:pPr marL="0" marR="0" lvl="0" indent="0" algn="ctr" defTabSz="914400" eaLnBrk="1" fontAlgn="auto" latinLnBrk="0" hangingPunct="1">
+              <a:lnSpc>
+                <a:spcPct val="100000"/>
+              </a:lnSpc>
+              <a:spcBef>
+                <a:spcPts val="0"/>
+              </a:spcBef>
+              <a:spcAft>
+                <a:spcPts val="0"/>
+              </a:spcAft>
+              <a:buClr>
+                <a:srgbClr val="000000"/>
+              </a:buClr>
+              <a:buSzTx/>
+              <a:buFont typeface="Arial"/>
+              <a:buNone/>
+              <a:tabLst/>
+              <a:defRPr/>
+            </a:pPr>
+            <a:r>
+              <a:rPr kumimoji="0" lang="en-US" sz="1400" b="0" i="0" u="none" strike="noStrike" kern="0" cap="none" spc="0" normalizeH="0" baseline="0" noProof="0" dirty="0">
+                <a:ln>
+                  <a:noFill/>
+                </a:ln>
+                <a:solidFill>
+                  <a:srgbClr val="FFFFFF"/>
+                </a:solidFill>
+                <a:effectLst/>
+                <a:uLnTx/>
+                <a:uFillTx/>
+                <a:latin typeface="Arial"/>
+                <a:ea typeface="+mn-ea"/>
+                <a:cs typeface="+mn-cs"/>
+                <a:sym typeface="Arial"/>
+              </a:rPr>
+              <a:t>Maze Set </a:t>
+            </a:r>
+            <a:r>
+              <a:rPr kumimoji="0" lang="en-US" sz="1400" b="0" i="1" u="none" strike="noStrike" kern="0" cap="none" spc="0" normalizeH="0" baseline="0" noProof="0" dirty="0" err="1">
+                <a:ln>
+                  <a:noFill/>
+                </a:ln>
+                <a:solidFill>
+                  <a:srgbClr val="FFFFFF"/>
+                </a:solidFill>
+                <a:effectLst/>
+                <a:uLnTx/>
+                <a:uFillTx/>
+                <a:latin typeface="Arial"/>
+                <a:ea typeface="+mn-ea"/>
+                <a:cs typeface="+mn-cs"/>
+                <a:sym typeface="Arial"/>
+              </a:rPr>
+              <a:t>i</a:t>
+            </a:r>
+            <a:r>
+              <a:rPr kumimoji="0" lang="en-US" sz="1400" b="0" i="0" u="none" strike="noStrike" kern="0" cap="none" spc="0" normalizeH="0" baseline="0" noProof="0" dirty="0">
+                <a:ln>
+                  <a:noFill/>
+                </a:ln>
+                <a:solidFill>
+                  <a:srgbClr val="FFFFFF"/>
+                </a:solidFill>
+                <a:effectLst/>
+                <a:uLnTx/>
+                <a:uFillTx/>
+                <a:latin typeface="Arial"/>
+                <a:ea typeface="+mn-ea"/>
+                <a:cs typeface="+mn-cs"/>
+                <a:sym typeface="Arial"/>
+              </a:rPr>
+              <a:t> maze 4</a:t>
+            </a:r>
+          </a:p>
+        </p:txBody>
+      </p:sp>
+      <p:cxnSp>
+        <p:nvCxnSpPr>
+          <p:cNvPr id="18" name="Straight Arrow Connector 17">
+            <a:extLst>
+              <a:ext uri="{FF2B5EF4-FFF2-40B4-BE49-F238E27FC236}">
+                <a16:creationId xmlns:a16="http://schemas.microsoft.com/office/drawing/2014/main" id="{F7C460DA-4AD6-4992-9A97-EBA7A87FB053}"/>
+              </a:ext>
+            </a:extLst>
+          </p:cNvPr>
+          <p:cNvCxnSpPr>
+            <a:cxnSpLocks/>
+            <a:stCxn id="14" idx="2"/>
+            <a:endCxn id="15" idx="0"/>
+          </p:cNvCxnSpPr>
+          <p:nvPr/>
+        </p:nvCxnSpPr>
+        <p:spPr>
+          <a:xfrm>
+            <a:off x="8656652" y="1216524"/>
+            <a:ext cx="0" cy="180781"/>
+          </a:xfrm>
+          <a:prstGeom prst="straightConnector1">
+            <a:avLst/>
+          </a:prstGeom>
+          <a:noFill/>
+          <a:ln w="9525" cap="flat" cmpd="sng" algn="ctr">
+            <a:solidFill>
+              <a:srgbClr val="4F81BD">
+                <a:shade val="95000"/>
+                <a:satMod val="105000"/>
+              </a:srgbClr>
+            </a:solidFill>
+            <a:prstDash val="solid"/>
+            <a:tailEnd type="triangle"/>
+          </a:ln>
+          <a:effectLst/>
+        </p:spPr>
+      </p:cxnSp>
+      <p:cxnSp>
+        <p:nvCxnSpPr>
+          <p:cNvPr id="19" name="Straight Arrow Connector 18">
+            <a:extLst>
+              <a:ext uri="{FF2B5EF4-FFF2-40B4-BE49-F238E27FC236}">
+                <a16:creationId xmlns:a16="http://schemas.microsoft.com/office/drawing/2014/main" id="{60ABC91A-22B3-487D-B63A-4E870CC3A99D}"/>
+              </a:ext>
+            </a:extLst>
+          </p:cNvPr>
+          <p:cNvCxnSpPr>
+            <a:cxnSpLocks/>
+            <a:stCxn id="15" idx="2"/>
+            <a:endCxn id="16" idx="0"/>
+          </p:cNvCxnSpPr>
+          <p:nvPr/>
+        </p:nvCxnSpPr>
+        <p:spPr>
+          <a:xfrm>
+            <a:off x="8656652" y="1859622"/>
+            <a:ext cx="0" cy="180781"/>
+          </a:xfrm>
+          <a:prstGeom prst="straightConnector1">
+            <a:avLst/>
+          </a:prstGeom>
+          <a:noFill/>
+          <a:ln w="9525" cap="flat" cmpd="sng" algn="ctr">
+            <a:solidFill>
+              <a:srgbClr val="4F81BD">
+                <a:shade val="95000"/>
+                <a:satMod val="105000"/>
+              </a:srgbClr>
+            </a:solidFill>
+            <a:prstDash val="solid"/>
+            <a:tailEnd type="triangle"/>
+          </a:ln>
+          <a:effectLst/>
+        </p:spPr>
+      </p:cxnSp>
+      <p:cxnSp>
+        <p:nvCxnSpPr>
+          <p:cNvPr id="20" name="Straight Arrow Connector 19">
+            <a:extLst>
+              <a:ext uri="{FF2B5EF4-FFF2-40B4-BE49-F238E27FC236}">
+                <a16:creationId xmlns:a16="http://schemas.microsoft.com/office/drawing/2014/main" id="{CC28504A-52B8-42AC-8017-1BC182DE0184}"/>
+              </a:ext>
+            </a:extLst>
+          </p:cNvPr>
+          <p:cNvCxnSpPr>
+            <a:cxnSpLocks/>
+            <a:stCxn id="16" idx="2"/>
+            <a:endCxn id="17" idx="0"/>
+          </p:cNvCxnSpPr>
+          <p:nvPr/>
+        </p:nvCxnSpPr>
+        <p:spPr>
+          <a:xfrm>
+            <a:off x="8656652" y="2502720"/>
+            <a:ext cx="0" cy="180781"/>
+          </a:xfrm>
+          <a:prstGeom prst="straightConnector1">
+            <a:avLst/>
+          </a:prstGeom>
+          <a:noFill/>
+          <a:ln w="9525" cap="flat" cmpd="sng" algn="ctr">
+            <a:solidFill>
+              <a:srgbClr val="4F81BD">
+                <a:shade val="95000"/>
+                <a:satMod val="105000"/>
+              </a:srgbClr>
+            </a:solidFill>
+            <a:prstDash val="solid"/>
+            <a:tailEnd type="triangle"/>
+          </a:ln>
+          <a:effectLst/>
+        </p:spPr>
+      </p:cxnSp>
+      <p:sp>
+        <p:nvSpPr>
+          <p:cNvPr id="21" name="Rectangle 20">
+            <a:extLst>
+              <a:ext uri="{FF2B5EF4-FFF2-40B4-BE49-F238E27FC236}">
+                <a16:creationId xmlns:a16="http://schemas.microsoft.com/office/drawing/2014/main" id="{5AB72EEF-2059-4956-90B8-D3FDC3EB0CF7}"/>
+              </a:ext>
+            </a:extLst>
+          </p:cNvPr>
+          <p:cNvSpPr/>
+          <p:nvPr/>
+        </p:nvSpPr>
+        <p:spPr>
+          <a:xfrm>
+            <a:off x="7916876" y="3326599"/>
+            <a:ext cx="1479552" cy="462317"/>
+          </a:xfrm>
+          <a:prstGeom prst="rect">
+            <a:avLst/>
+          </a:prstGeom>
+          <a:solidFill>
+            <a:srgbClr val="4F81BD"/>
+          </a:solidFill>
+          <a:ln w="25400" cap="flat" cmpd="sng" algn="ctr">
+            <a:solidFill>
+              <a:srgbClr val="4F81BD">
+                <a:shade val="50000"/>
+              </a:srgbClr>
+            </a:solidFill>
+            <a:prstDash val="solid"/>
+          </a:ln>
+          <a:effectLst/>
+        </p:spPr>
+        <p:txBody>
+          <a:bodyPr rtlCol="0" anchor="ctr"/>
+          <a:lstStyle/>
+          <a:p>
+            <a:pPr marL="0" marR="0" lvl="0" indent="0" algn="ctr" defTabSz="914400" eaLnBrk="1" fontAlgn="auto" latinLnBrk="0" hangingPunct="1">
+              <a:lnSpc>
+                <a:spcPct val="100000"/>
+              </a:lnSpc>
+              <a:spcBef>
+                <a:spcPts val="0"/>
+              </a:spcBef>
+              <a:spcAft>
+                <a:spcPts val="0"/>
+              </a:spcAft>
+              <a:buClr>
+                <a:srgbClr val="000000"/>
+              </a:buClr>
+              <a:buSzTx/>
+              <a:buFont typeface="Arial"/>
+              <a:buNone/>
+              <a:tabLst/>
+              <a:defRPr/>
+            </a:pPr>
+            <a:r>
+              <a:rPr kumimoji="0" lang="en-US" sz="1400" b="0" i="0" u="none" strike="noStrike" kern="0" cap="none" spc="0" normalizeH="0" baseline="0" noProof="0" dirty="0">
+                <a:ln>
+                  <a:noFill/>
+                </a:ln>
+                <a:solidFill>
+                  <a:srgbClr val="FFFFFF"/>
+                </a:solidFill>
+                <a:effectLst/>
+                <a:uLnTx/>
+                <a:uFillTx/>
+                <a:latin typeface="Arial"/>
+                <a:ea typeface="+mn-ea"/>
+                <a:cs typeface="+mn-cs"/>
+                <a:sym typeface="Arial"/>
+              </a:rPr>
+              <a:t>Maze Set </a:t>
+            </a:r>
+            <a:r>
+              <a:rPr kumimoji="0" lang="en-US" sz="1400" b="0" i="1" u="none" strike="noStrike" kern="0" cap="none" spc="0" normalizeH="0" baseline="0" noProof="0" dirty="0" err="1">
+                <a:ln>
+                  <a:noFill/>
+                </a:ln>
+                <a:solidFill>
+                  <a:srgbClr val="FFFFFF"/>
+                </a:solidFill>
+                <a:effectLst/>
+                <a:uLnTx/>
+                <a:uFillTx/>
+                <a:latin typeface="Arial"/>
+                <a:ea typeface="+mn-ea"/>
+                <a:cs typeface="+mn-cs"/>
+                <a:sym typeface="Arial"/>
+              </a:rPr>
+              <a:t>i</a:t>
+            </a:r>
+            <a:r>
+              <a:rPr kumimoji="0" lang="en-US" sz="1400" b="0" i="0" u="none" strike="noStrike" kern="0" cap="none" spc="0" normalizeH="0" baseline="0" noProof="0" dirty="0">
+                <a:ln>
+                  <a:noFill/>
+                </a:ln>
+                <a:solidFill>
+                  <a:srgbClr val="FFFFFF"/>
+                </a:solidFill>
+                <a:effectLst/>
+                <a:uLnTx/>
+                <a:uFillTx/>
+                <a:latin typeface="Arial"/>
+                <a:ea typeface="+mn-ea"/>
+                <a:cs typeface="+mn-cs"/>
+                <a:sym typeface="Arial"/>
+              </a:rPr>
+              <a:t> trust questionnaire</a:t>
+            </a:r>
+          </a:p>
+        </p:txBody>
+      </p:sp>
+      <p:cxnSp>
+        <p:nvCxnSpPr>
+          <p:cNvPr id="22" name="Straight Arrow Connector 21">
+            <a:extLst>
+              <a:ext uri="{FF2B5EF4-FFF2-40B4-BE49-F238E27FC236}">
+                <a16:creationId xmlns:a16="http://schemas.microsoft.com/office/drawing/2014/main" id="{2C2055A8-4F61-4E66-A68C-215CEAF6467A}"/>
+              </a:ext>
+            </a:extLst>
+          </p:cNvPr>
+          <p:cNvCxnSpPr>
+            <a:cxnSpLocks/>
+            <a:stCxn id="17" idx="2"/>
+            <a:endCxn id="21" idx="0"/>
+          </p:cNvCxnSpPr>
+          <p:nvPr/>
+        </p:nvCxnSpPr>
+        <p:spPr>
+          <a:xfrm>
+            <a:off x="8656652" y="3145818"/>
+            <a:ext cx="0" cy="180781"/>
+          </a:xfrm>
+          <a:prstGeom prst="straightConnector1">
+            <a:avLst/>
+          </a:prstGeom>
+          <a:noFill/>
+          <a:ln w="9525" cap="flat" cmpd="sng" algn="ctr">
+            <a:solidFill>
+              <a:srgbClr val="4F81BD">
+                <a:shade val="95000"/>
+                <a:satMod val="105000"/>
+              </a:srgbClr>
+            </a:solidFill>
+            <a:prstDash val="solid"/>
+            <a:tailEnd type="triangle"/>
+          </a:ln>
+          <a:effectLst/>
+        </p:spPr>
+      </p:cxnSp>
+      <p:cxnSp>
+        <p:nvCxnSpPr>
+          <p:cNvPr id="23" name="Connector: Elbow 22">
+            <a:extLst>
+              <a:ext uri="{FF2B5EF4-FFF2-40B4-BE49-F238E27FC236}">
+                <a16:creationId xmlns:a16="http://schemas.microsoft.com/office/drawing/2014/main" id="{77261757-4EFD-4AB1-BD08-40974A6A9B6E}"/>
+              </a:ext>
+            </a:extLst>
+          </p:cNvPr>
+          <p:cNvCxnSpPr>
+            <a:cxnSpLocks/>
+            <a:stCxn id="7" idx="3"/>
+            <a:endCxn id="14" idx="0"/>
+          </p:cNvCxnSpPr>
+          <p:nvPr/>
+        </p:nvCxnSpPr>
+        <p:spPr>
+          <a:xfrm flipV="1">
+            <a:off x="7759551" y="754207"/>
+            <a:ext cx="897101" cy="1999667"/>
+          </a:xfrm>
+          <a:prstGeom prst="bentConnector4">
+            <a:avLst>
+              <a:gd name="adj1" fmla="val 19828"/>
+              <a:gd name="adj2" fmla="val 111432"/>
+            </a:avLst>
+          </a:prstGeom>
+          <a:noFill/>
+          <a:ln w="9525" cap="flat" cmpd="sng" algn="ctr">
+            <a:solidFill>
+              <a:srgbClr val="4F81BD">
+                <a:shade val="95000"/>
+                <a:satMod val="105000"/>
+              </a:srgbClr>
+            </a:solidFill>
+            <a:prstDash val="solid"/>
+            <a:tailEnd type="triangle"/>
+          </a:ln>
+          <a:effectLst/>
+        </p:spPr>
+      </p:cxnSp>
+      <p:cxnSp>
+        <p:nvCxnSpPr>
+          <p:cNvPr id="24" name="Connector: Elbow 23">
+            <a:extLst>
+              <a:ext uri="{FF2B5EF4-FFF2-40B4-BE49-F238E27FC236}">
+                <a16:creationId xmlns:a16="http://schemas.microsoft.com/office/drawing/2014/main" id="{C1275F6D-C6F1-411A-869D-6FE179A6ED1D}"/>
+              </a:ext>
+            </a:extLst>
+          </p:cNvPr>
+          <p:cNvCxnSpPr>
+            <a:cxnSpLocks/>
+            <a:stCxn id="33" idx="2"/>
+            <a:endCxn id="7" idx="2"/>
+          </p:cNvCxnSpPr>
+          <p:nvPr/>
+        </p:nvCxnSpPr>
+        <p:spPr>
+          <a:xfrm rot="5400000" flipH="1">
+            <a:off x="7102480" y="3003196"/>
+            <a:ext cx="1572335" cy="1536009"/>
+          </a:xfrm>
+          <a:prstGeom prst="bentConnector3">
+            <a:avLst>
+              <a:gd name="adj1" fmla="val -6231"/>
+            </a:avLst>
+          </a:prstGeom>
+          <a:noFill/>
+          <a:ln w="9525" cap="flat" cmpd="sng" algn="ctr">
+            <a:solidFill>
+              <a:srgbClr val="4F81BD">
+                <a:shade val="95000"/>
+                <a:satMod val="105000"/>
+              </a:srgbClr>
+            </a:solidFill>
+            <a:prstDash val="solid"/>
+            <a:tailEnd type="triangle"/>
+          </a:ln>
+          <a:effectLst/>
+        </p:spPr>
+      </p:cxnSp>
+      <p:sp>
+        <p:nvSpPr>
+          <p:cNvPr id="25" name="Rectangle 24">
+            <a:extLst>
+              <a:ext uri="{FF2B5EF4-FFF2-40B4-BE49-F238E27FC236}">
+                <a16:creationId xmlns:a16="http://schemas.microsoft.com/office/drawing/2014/main" id="{86DFE3E0-E790-4021-8552-A7A6F621CBD8}"/>
+              </a:ext>
+            </a:extLst>
+          </p:cNvPr>
+          <p:cNvSpPr/>
+          <p:nvPr/>
+        </p:nvSpPr>
+        <p:spPr>
+          <a:xfrm>
+            <a:off x="7916876" y="4974480"/>
+            <a:ext cx="1479552" cy="462317"/>
+          </a:xfrm>
+          <a:prstGeom prst="rect">
+            <a:avLst/>
+          </a:prstGeom>
+          <a:solidFill>
+            <a:srgbClr val="4F81BD"/>
+          </a:solidFill>
+          <a:ln w="25400" cap="flat" cmpd="sng" algn="ctr">
+            <a:solidFill>
+              <a:srgbClr val="4F81BD">
+                <a:shade val="50000"/>
+              </a:srgbClr>
+            </a:solidFill>
+            <a:prstDash val="solid"/>
+          </a:ln>
+          <a:effectLst/>
+        </p:spPr>
+        <p:txBody>
+          <a:bodyPr rtlCol="0" anchor="ctr"/>
+          <a:lstStyle/>
+          <a:p>
+            <a:pPr marL="0" marR="0" lvl="0" indent="0" algn="ctr" defTabSz="914400" eaLnBrk="1" fontAlgn="auto" latinLnBrk="0" hangingPunct="1">
+              <a:lnSpc>
+                <a:spcPct val="100000"/>
+              </a:lnSpc>
+              <a:spcBef>
+                <a:spcPts val="0"/>
+              </a:spcBef>
+              <a:spcAft>
+                <a:spcPts val="0"/>
+              </a:spcAft>
+              <a:buClr>
+                <a:srgbClr val="000000"/>
+              </a:buClr>
+              <a:buSzTx/>
+              <a:buFont typeface="Arial"/>
+              <a:buNone/>
+              <a:tabLst/>
+              <a:defRPr/>
+            </a:pPr>
+            <a:r>
+              <a:rPr kumimoji="0" lang="en-US" sz="1400" b="0" i="0" u="none" strike="noStrike" kern="0" cap="none" spc="0" normalizeH="0" baseline="0" noProof="0" dirty="0">
+                <a:ln>
+                  <a:noFill/>
+                </a:ln>
+                <a:solidFill>
+                  <a:srgbClr val="FFFFFF"/>
+                </a:solidFill>
+                <a:effectLst/>
+                <a:uLnTx/>
+                <a:uFillTx/>
+                <a:latin typeface="Arial"/>
+                <a:ea typeface="+mn-ea"/>
+                <a:cs typeface="+mn-cs"/>
+                <a:sym typeface="Arial"/>
+              </a:rPr>
+              <a:t>Demographic questionnaire</a:t>
+            </a:r>
+          </a:p>
+        </p:txBody>
+      </p:sp>
+      <p:cxnSp>
+        <p:nvCxnSpPr>
+          <p:cNvPr id="26" name="Straight Arrow Connector 25">
+            <a:extLst>
+              <a:ext uri="{FF2B5EF4-FFF2-40B4-BE49-F238E27FC236}">
+                <a16:creationId xmlns:a16="http://schemas.microsoft.com/office/drawing/2014/main" id="{55239E98-B376-417E-BEC8-6EADDD12590B}"/>
+              </a:ext>
+            </a:extLst>
+          </p:cNvPr>
+          <p:cNvCxnSpPr>
+            <a:cxnSpLocks/>
+            <a:stCxn id="33" idx="2"/>
+            <a:endCxn id="25" idx="0"/>
+          </p:cNvCxnSpPr>
+          <p:nvPr/>
+        </p:nvCxnSpPr>
+        <p:spPr>
+          <a:xfrm>
+            <a:off x="8656652" y="4557367"/>
+            <a:ext cx="0" cy="417113"/>
+          </a:xfrm>
+          <a:prstGeom prst="straightConnector1">
+            <a:avLst/>
+          </a:prstGeom>
+          <a:noFill/>
+          <a:ln w="9525" cap="flat" cmpd="sng" algn="ctr">
+            <a:solidFill>
+              <a:srgbClr val="4F81BD">
+                <a:shade val="95000"/>
+                <a:satMod val="105000"/>
+              </a:srgbClr>
+            </a:solidFill>
+            <a:prstDash val="solid"/>
+            <a:tailEnd type="triangle"/>
+          </a:ln>
+          <a:effectLst/>
+        </p:spPr>
+      </p:cxnSp>
+      <p:sp>
+        <p:nvSpPr>
+          <p:cNvPr id="27" name="Rectangle 26">
+            <a:extLst>
+              <a:ext uri="{FF2B5EF4-FFF2-40B4-BE49-F238E27FC236}">
+                <a16:creationId xmlns:a16="http://schemas.microsoft.com/office/drawing/2014/main" id="{C0463B2C-2B73-4E6A-9DD5-74E701D0AC50}"/>
+              </a:ext>
+            </a:extLst>
+          </p:cNvPr>
+          <p:cNvSpPr/>
+          <p:nvPr/>
+        </p:nvSpPr>
+        <p:spPr>
+          <a:xfrm>
+            <a:off x="7708146" y="5682777"/>
+            <a:ext cx="1897012" cy="462317"/>
+          </a:xfrm>
+          <a:prstGeom prst="rect">
+            <a:avLst/>
+          </a:prstGeom>
+          <a:solidFill>
+            <a:srgbClr val="4F81BD"/>
+          </a:solidFill>
+          <a:ln w="25400" cap="flat" cmpd="sng" algn="ctr">
+            <a:solidFill>
+              <a:srgbClr val="4F81BD">
+                <a:shade val="50000"/>
+              </a:srgbClr>
+            </a:solidFill>
+            <a:prstDash val="solid"/>
+          </a:ln>
+          <a:effectLst/>
+        </p:spPr>
+        <p:txBody>
+          <a:bodyPr rtlCol="0" anchor="ctr"/>
+          <a:lstStyle/>
+          <a:p>
+            <a:pPr marL="0" marR="0" lvl="0" indent="0" algn="ctr" defTabSz="914400" eaLnBrk="1" fontAlgn="auto" latinLnBrk="0" hangingPunct="1">
+              <a:lnSpc>
+                <a:spcPct val="100000"/>
+              </a:lnSpc>
+              <a:spcBef>
+                <a:spcPts val="0"/>
+              </a:spcBef>
+              <a:spcAft>
+                <a:spcPts val="0"/>
+              </a:spcAft>
+              <a:buClr>
+                <a:srgbClr val="000000"/>
+              </a:buClr>
+              <a:buSzTx/>
+              <a:buFont typeface="Arial"/>
+              <a:buNone/>
+              <a:tabLst/>
+              <a:defRPr/>
+            </a:pPr>
+            <a:r>
+              <a:rPr kumimoji="0" lang="en-US" sz="1400" b="0" i="0" u="none" strike="noStrike" kern="0" cap="none" spc="0" normalizeH="0" baseline="0" noProof="0" dirty="0">
+                <a:ln>
+                  <a:noFill/>
+                </a:ln>
+                <a:solidFill>
+                  <a:srgbClr val="FFFFFF"/>
+                </a:solidFill>
+                <a:effectLst/>
+                <a:uLnTx/>
+                <a:uFillTx/>
+                <a:latin typeface="Arial"/>
+                <a:ea typeface="+mn-ea"/>
+                <a:cs typeface="+mn-cs"/>
+                <a:sym typeface="Arial"/>
+              </a:rPr>
+              <a:t>Turk completion code (study complete)</a:t>
+            </a:r>
+          </a:p>
+        </p:txBody>
+      </p:sp>
+      <p:cxnSp>
+        <p:nvCxnSpPr>
+          <p:cNvPr id="28" name="Straight Arrow Connector 27">
+            <a:extLst>
+              <a:ext uri="{FF2B5EF4-FFF2-40B4-BE49-F238E27FC236}">
+                <a16:creationId xmlns:a16="http://schemas.microsoft.com/office/drawing/2014/main" id="{811794F9-E15E-4F8C-9F88-4FFB521EE5C5}"/>
+              </a:ext>
+            </a:extLst>
+          </p:cNvPr>
+          <p:cNvCxnSpPr>
+            <a:cxnSpLocks/>
+            <a:stCxn id="25" idx="2"/>
+            <a:endCxn id="27" idx="0"/>
+          </p:cNvCxnSpPr>
+          <p:nvPr/>
+        </p:nvCxnSpPr>
+        <p:spPr>
+          <a:xfrm>
+            <a:off x="8656652" y="5436797"/>
+            <a:ext cx="0" cy="245980"/>
+          </a:xfrm>
+          <a:prstGeom prst="straightConnector1">
+            <a:avLst/>
+          </a:prstGeom>
+          <a:noFill/>
+          <a:ln w="9525" cap="flat" cmpd="sng" algn="ctr">
+            <a:solidFill>
+              <a:srgbClr val="4F81BD">
+                <a:shade val="95000"/>
+                <a:satMod val="105000"/>
+              </a:srgbClr>
+            </a:solidFill>
+            <a:prstDash val="solid"/>
+            <a:tailEnd type="triangle"/>
+          </a:ln>
+          <a:effectLst/>
+        </p:spPr>
+      </p:cxnSp>
+      <p:sp>
+        <p:nvSpPr>
+          <p:cNvPr id="29" name="TextBox 28">
+            <a:extLst>
+              <a:ext uri="{FF2B5EF4-FFF2-40B4-BE49-F238E27FC236}">
+                <a16:creationId xmlns:a16="http://schemas.microsoft.com/office/drawing/2014/main" id="{6FC48946-A2B6-4ECA-A19B-0D89BFF0CC55}"/>
+              </a:ext>
+            </a:extLst>
+          </p:cNvPr>
+          <p:cNvSpPr txBox="1"/>
+          <p:nvPr/>
+        </p:nvSpPr>
+        <p:spPr>
+          <a:xfrm>
+            <a:off x="2124526" y="2302255"/>
+            <a:ext cx="413896" cy="307777"/>
+          </a:xfrm>
+          <a:prstGeom prst="rect">
+            <a:avLst/>
+          </a:prstGeom>
+          <a:noFill/>
+        </p:spPr>
+        <p:txBody>
+          <a:bodyPr wrap="none" rtlCol="0">
+            <a:spAutoFit/>
+          </a:bodyPr>
+          <a:lstStyle/>
+          <a:p>
+            <a:pPr>
+              <a:buClr>
+                <a:srgbClr val="000000"/>
+              </a:buClr>
+              <a:buFont typeface="Arial"/>
+              <a:buNone/>
+            </a:pPr>
+            <a:r>
+              <a:rPr lang="en-US" sz="1400" kern="0" dirty="0">
+                <a:solidFill>
+                  <a:srgbClr val="000000"/>
+                </a:solidFill>
+                <a:latin typeface="Arial"/>
+                <a:cs typeface="Arial"/>
+                <a:sym typeface="Arial"/>
+              </a:rPr>
+              <a:t>No</a:t>
+            </a:r>
+          </a:p>
+        </p:txBody>
+      </p:sp>
+      <p:sp>
+        <p:nvSpPr>
+          <p:cNvPr id="30" name="TextBox 29">
+            <a:extLst>
+              <a:ext uri="{FF2B5EF4-FFF2-40B4-BE49-F238E27FC236}">
+                <a16:creationId xmlns:a16="http://schemas.microsoft.com/office/drawing/2014/main" id="{F08970B1-EC74-4278-BA89-74F0C2C465BA}"/>
+              </a:ext>
+            </a:extLst>
+          </p:cNvPr>
+          <p:cNvSpPr txBox="1"/>
+          <p:nvPr/>
+        </p:nvSpPr>
+        <p:spPr>
+          <a:xfrm>
+            <a:off x="3516839" y="2218701"/>
+            <a:ext cx="413896" cy="307777"/>
+          </a:xfrm>
+          <a:prstGeom prst="rect">
+            <a:avLst/>
+          </a:prstGeom>
+          <a:noFill/>
+        </p:spPr>
+        <p:txBody>
+          <a:bodyPr wrap="none" rtlCol="0">
+            <a:spAutoFit/>
+          </a:bodyPr>
+          <a:lstStyle/>
+          <a:p>
+            <a:pPr>
+              <a:buClr>
+                <a:srgbClr val="000000"/>
+              </a:buClr>
+              <a:buFont typeface="Arial"/>
+              <a:buNone/>
+            </a:pPr>
+            <a:r>
+              <a:rPr lang="en-US" sz="1400" kern="0" dirty="0">
+                <a:solidFill>
+                  <a:srgbClr val="000000"/>
+                </a:solidFill>
+                <a:latin typeface="Arial"/>
+                <a:cs typeface="Arial"/>
+                <a:sym typeface="Arial"/>
+              </a:rPr>
+              <a:t>No</a:t>
+            </a:r>
+          </a:p>
+        </p:txBody>
+      </p:sp>
+      <p:sp>
+        <p:nvSpPr>
+          <p:cNvPr id="31" name="TextBox 30">
+            <a:extLst>
+              <a:ext uri="{FF2B5EF4-FFF2-40B4-BE49-F238E27FC236}">
+                <a16:creationId xmlns:a16="http://schemas.microsoft.com/office/drawing/2014/main" id="{CA78EC90-B0C2-49B4-9BCB-B4552EEB197A}"/>
+              </a:ext>
+            </a:extLst>
+          </p:cNvPr>
+          <p:cNvSpPr txBox="1"/>
+          <p:nvPr/>
+        </p:nvSpPr>
+        <p:spPr>
+          <a:xfrm>
+            <a:off x="2897378" y="2750758"/>
+            <a:ext cx="494046" cy="307777"/>
+          </a:xfrm>
+          <a:prstGeom prst="rect">
+            <a:avLst/>
+          </a:prstGeom>
+          <a:noFill/>
+        </p:spPr>
+        <p:txBody>
+          <a:bodyPr wrap="none" rtlCol="0">
+            <a:spAutoFit/>
+          </a:bodyPr>
+          <a:lstStyle/>
+          <a:p>
+            <a:pPr>
+              <a:buClr>
+                <a:srgbClr val="000000"/>
+              </a:buClr>
+              <a:buFont typeface="Arial"/>
+              <a:buNone/>
+            </a:pPr>
+            <a:r>
+              <a:rPr lang="en-US" sz="1400" kern="0" dirty="0">
+                <a:solidFill>
+                  <a:srgbClr val="000000"/>
+                </a:solidFill>
+                <a:latin typeface="Arial"/>
+                <a:cs typeface="Arial"/>
+                <a:sym typeface="Arial"/>
+              </a:rPr>
+              <a:t>Yes</a:t>
+            </a:r>
+          </a:p>
+        </p:txBody>
+      </p:sp>
+      <p:sp>
+        <p:nvSpPr>
+          <p:cNvPr id="32" name="TextBox 31">
+            <a:extLst>
+              <a:ext uri="{FF2B5EF4-FFF2-40B4-BE49-F238E27FC236}">
+                <a16:creationId xmlns:a16="http://schemas.microsoft.com/office/drawing/2014/main" id="{E675D954-C47C-48F3-9007-5B715F8DF8EA}"/>
+              </a:ext>
+            </a:extLst>
+          </p:cNvPr>
+          <p:cNvSpPr txBox="1"/>
+          <p:nvPr/>
+        </p:nvSpPr>
+        <p:spPr>
+          <a:xfrm>
+            <a:off x="4305540" y="2760805"/>
+            <a:ext cx="494046" cy="307777"/>
+          </a:xfrm>
+          <a:prstGeom prst="rect">
+            <a:avLst/>
+          </a:prstGeom>
+          <a:noFill/>
+        </p:spPr>
+        <p:txBody>
+          <a:bodyPr wrap="none" rtlCol="0">
+            <a:spAutoFit/>
+          </a:bodyPr>
+          <a:lstStyle/>
+          <a:p>
+            <a:pPr>
+              <a:buClr>
+                <a:srgbClr val="000000"/>
+              </a:buClr>
+              <a:buFont typeface="Arial"/>
+              <a:buNone/>
+            </a:pPr>
+            <a:r>
+              <a:rPr lang="en-US" sz="1400" kern="0" dirty="0">
+                <a:solidFill>
+                  <a:srgbClr val="000000"/>
+                </a:solidFill>
+                <a:latin typeface="Arial"/>
+                <a:cs typeface="Arial"/>
+                <a:sym typeface="Arial"/>
+              </a:rPr>
+              <a:t>Yes</a:t>
+            </a:r>
+          </a:p>
+        </p:txBody>
+      </p:sp>
+      <p:sp>
+        <p:nvSpPr>
+          <p:cNvPr id="33" name="Rectangle 32">
+            <a:extLst>
+              <a:ext uri="{FF2B5EF4-FFF2-40B4-BE49-F238E27FC236}">
+                <a16:creationId xmlns:a16="http://schemas.microsoft.com/office/drawing/2014/main" id="{3E2CBB39-9626-4C8D-B744-5B24D32227A9}"/>
+              </a:ext>
+            </a:extLst>
+          </p:cNvPr>
+          <p:cNvSpPr/>
+          <p:nvPr/>
+        </p:nvSpPr>
+        <p:spPr>
+          <a:xfrm>
+            <a:off x="7916876" y="4095050"/>
+            <a:ext cx="1479552" cy="462317"/>
+          </a:xfrm>
+          <a:prstGeom prst="rect">
+            <a:avLst/>
+          </a:prstGeom>
+          <a:solidFill>
+            <a:srgbClr val="4F81BD"/>
+          </a:solidFill>
+          <a:ln w="25400" cap="flat" cmpd="sng" algn="ctr">
+            <a:solidFill>
+              <a:srgbClr val="4F81BD">
+                <a:shade val="50000"/>
+              </a:srgbClr>
+            </a:solidFill>
+            <a:prstDash val="solid"/>
+          </a:ln>
+          <a:effectLst/>
+        </p:spPr>
+        <p:txBody>
+          <a:bodyPr rtlCol="0" anchor="ctr"/>
+          <a:lstStyle/>
+          <a:p>
+            <a:pPr marL="0" marR="0" lvl="0" indent="0" algn="ctr" defTabSz="914400" eaLnBrk="1" fontAlgn="auto" latinLnBrk="0" hangingPunct="1">
+              <a:lnSpc>
+                <a:spcPct val="100000"/>
+              </a:lnSpc>
+              <a:spcBef>
+                <a:spcPts val="0"/>
+              </a:spcBef>
+              <a:spcAft>
+                <a:spcPts val="0"/>
+              </a:spcAft>
+              <a:buClr>
+                <a:srgbClr val="000000"/>
+              </a:buClr>
+              <a:buSzTx/>
+              <a:buFont typeface="Arial"/>
+              <a:buNone/>
+              <a:tabLst/>
+              <a:defRPr/>
+            </a:pPr>
+            <a:r>
+              <a:rPr kumimoji="0" lang="en-US" sz="1400" b="0" i="0" u="none" strike="noStrike" kern="0" cap="none" spc="0" normalizeH="0" baseline="0" noProof="0" dirty="0">
+                <a:ln>
+                  <a:noFill/>
+                </a:ln>
+                <a:solidFill>
+                  <a:srgbClr val="FFFFFF"/>
+                </a:solidFill>
+                <a:effectLst/>
+                <a:uLnTx/>
+                <a:uFillTx/>
+                <a:latin typeface="Arial"/>
+                <a:ea typeface="+mn-ea"/>
+                <a:cs typeface="+mn-cs"/>
+                <a:sym typeface="Arial"/>
+              </a:rPr>
+              <a:t>3 Maze Sets complete?</a:t>
+            </a:r>
+          </a:p>
+        </p:txBody>
+      </p:sp>
+      <p:cxnSp>
+        <p:nvCxnSpPr>
+          <p:cNvPr id="34" name="Straight Arrow Connector 33">
+            <a:extLst>
+              <a:ext uri="{FF2B5EF4-FFF2-40B4-BE49-F238E27FC236}">
+                <a16:creationId xmlns:a16="http://schemas.microsoft.com/office/drawing/2014/main" id="{6B306400-08E3-482E-B70F-5B11C6044EFE}"/>
+              </a:ext>
+            </a:extLst>
+          </p:cNvPr>
+          <p:cNvCxnSpPr>
+            <a:cxnSpLocks/>
+            <a:stCxn id="21" idx="2"/>
+            <a:endCxn id="33" idx="0"/>
+          </p:cNvCxnSpPr>
+          <p:nvPr/>
+        </p:nvCxnSpPr>
+        <p:spPr>
+          <a:xfrm>
+            <a:off x="8656652" y="3788916"/>
+            <a:ext cx="0" cy="306134"/>
+          </a:xfrm>
+          <a:prstGeom prst="straightConnector1">
+            <a:avLst/>
+          </a:prstGeom>
+          <a:noFill/>
+          <a:ln w="9525" cap="flat" cmpd="sng" algn="ctr">
+            <a:solidFill>
+              <a:srgbClr val="4F81BD">
+                <a:shade val="95000"/>
+                <a:satMod val="105000"/>
+              </a:srgbClr>
+            </a:solidFill>
+            <a:prstDash val="solid"/>
+            <a:tailEnd type="triangle"/>
+          </a:ln>
+          <a:effectLst/>
+        </p:spPr>
+      </p:cxnSp>
+      <p:sp>
+        <p:nvSpPr>
+          <p:cNvPr id="35" name="TextBox 34">
+            <a:extLst>
+              <a:ext uri="{FF2B5EF4-FFF2-40B4-BE49-F238E27FC236}">
+                <a16:creationId xmlns:a16="http://schemas.microsoft.com/office/drawing/2014/main" id="{0412685F-7CEE-4E03-A526-C014E44D7844}"/>
+              </a:ext>
+            </a:extLst>
+          </p:cNvPr>
+          <p:cNvSpPr txBox="1"/>
+          <p:nvPr/>
+        </p:nvSpPr>
+        <p:spPr>
+          <a:xfrm>
+            <a:off x="8646453" y="4663720"/>
+            <a:ext cx="494046" cy="307777"/>
+          </a:xfrm>
+          <a:prstGeom prst="rect">
+            <a:avLst/>
+          </a:prstGeom>
+          <a:noFill/>
+        </p:spPr>
+        <p:txBody>
+          <a:bodyPr wrap="none" rtlCol="0">
+            <a:spAutoFit/>
+          </a:bodyPr>
+          <a:lstStyle/>
+          <a:p>
+            <a:pPr>
+              <a:buClr>
+                <a:srgbClr val="000000"/>
+              </a:buClr>
+              <a:buFont typeface="Arial"/>
+              <a:buNone/>
+            </a:pPr>
+            <a:r>
+              <a:rPr lang="en-US" sz="1400" kern="0" dirty="0">
+                <a:solidFill>
+                  <a:srgbClr val="000000"/>
+                </a:solidFill>
+                <a:latin typeface="Arial"/>
+                <a:cs typeface="Arial"/>
+                <a:sym typeface="Arial"/>
+              </a:rPr>
+              <a:t>Yes</a:t>
+            </a:r>
+          </a:p>
+        </p:txBody>
+      </p:sp>
+      <p:sp>
+        <p:nvSpPr>
+          <p:cNvPr id="36" name="TextBox 35">
+            <a:extLst>
+              <a:ext uri="{FF2B5EF4-FFF2-40B4-BE49-F238E27FC236}">
+                <a16:creationId xmlns:a16="http://schemas.microsoft.com/office/drawing/2014/main" id="{884BEC23-A161-4C37-AB76-D7FA3FB0A623}"/>
+              </a:ext>
+            </a:extLst>
+          </p:cNvPr>
+          <p:cNvSpPr txBox="1"/>
+          <p:nvPr/>
+        </p:nvSpPr>
+        <p:spPr>
+          <a:xfrm>
+            <a:off x="7474751" y="4355943"/>
+            <a:ext cx="413896" cy="307777"/>
+          </a:xfrm>
+          <a:prstGeom prst="rect">
+            <a:avLst/>
+          </a:prstGeom>
+          <a:noFill/>
+        </p:spPr>
+        <p:txBody>
+          <a:bodyPr wrap="none" rtlCol="0">
+            <a:spAutoFit/>
+          </a:bodyPr>
+          <a:lstStyle/>
+          <a:p>
+            <a:pPr>
+              <a:buClr>
+                <a:srgbClr val="000000"/>
+              </a:buClr>
+              <a:buFont typeface="Arial"/>
+              <a:buNone/>
+            </a:pPr>
+            <a:r>
+              <a:rPr lang="en-US" sz="1400" kern="0" dirty="0">
+                <a:solidFill>
+                  <a:srgbClr val="000000"/>
+                </a:solidFill>
+                <a:latin typeface="Arial"/>
+                <a:cs typeface="Arial"/>
+                <a:sym typeface="Arial"/>
+              </a:rPr>
+              <a:t>No</a:t>
+            </a:r>
+          </a:p>
+        </p:txBody>
+      </p:sp>
+      <p:cxnSp>
+        <p:nvCxnSpPr>
+          <p:cNvPr id="37" name="Straight Arrow Connector 36">
+            <a:extLst>
+              <a:ext uri="{FF2B5EF4-FFF2-40B4-BE49-F238E27FC236}">
+                <a16:creationId xmlns:a16="http://schemas.microsoft.com/office/drawing/2014/main" id="{421876F0-3B80-4FB4-ABB6-C1001BF89740}"/>
+              </a:ext>
+            </a:extLst>
+          </p:cNvPr>
+          <p:cNvCxnSpPr>
+            <a:cxnSpLocks/>
+            <a:stCxn id="38" idx="6"/>
+            <a:endCxn id="4" idx="1"/>
+          </p:cNvCxnSpPr>
+          <p:nvPr/>
+        </p:nvCxnSpPr>
+        <p:spPr>
+          <a:xfrm>
+            <a:off x="1624489" y="2753872"/>
+            <a:ext cx="360379" cy="0"/>
+          </a:xfrm>
+          <a:prstGeom prst="straightConnector1">
+            <a:avLst/>
+          </a:prstGeom>
+          <a:noFill/>
+          <a:ln w="9525" cap="flat" cmpd="sng" algn="ctr">
+            <a:solidFill>
+              <a:srgbClr val="4F81BD">
+                <a:shade val="95000"/>
+                <a:satMod val="105000"/>
+              </a:srgbClr>
+            </a:solidFill>
+            <a:prstDash val="solid"/>
+            <a:tailEnd type="triangle"/>
+          </a:ln>
+          <a:effectLst/>
+        </p:spPr>
+      </p:cxnSp>
+      <p:sp>
+        <p:nvSpPr>
+          <p:cNvPr id="38" name="Oval 37">
+            <a:extLst>
+              <a:ext uri="{FF2B5EF4-FFF2-40B4-BE49-F238E27FC236}">
+                <a16:creationId xmlns:a16="http://schemas.microsoft.com/office/drawing/2014/main" id="{67AE8E68-00E7-4503-B490-5840D708AA0D}"/>
+              </a:ext>
+            </a:extLst>
+          </p:cNvPr>
+          <p:cNvSpPr/>
+          <p:nvPr/>
+        </p:nvSpPr>
+        <p:spPr>
+          <a:xfrm>
+            <a:off x="1097815" y="2512717"/>
+            <a:ext cx="526674" cy="482310"/>
+          </a:xfrm>
+          <a:prstGeom prst="ellipse">
+            <a:avLst/>
+          </a:prstGeom>
+          <a:solidFill>
+            <a:srgbClr val="4F81BD"/>
+          </a:solidFill>
+          <a:ln w="25400" cap="flat" cmpd="sng" algn="ctr">
+            <a:solidFill>
+              <a:srgbClr val="4F81BD">
+                <a:shade val="50000"/>
+              </a:srgbClr>
+            </a:solidFill>
+            <a:prstDash val="solid"/>
+          </a:ln>
+          <a:effectLst/>
+        </p:spPr>
+        <p:txBody>
+          <a:bodyPr rtlCol="0" anchor="ctr"/>
+          <a:lstStyle/>
+          <a:p>
+            <a:pPr marL="0" marR="0" lvl="0" indent="0" algn="ctr" defTabSz="914400" eaLnBrk="1" fontAlgn="auto" latinLnBrk="0" hangingPunct="1">
+              <a:lnSpc>
+                <a:spcPct val="100000"/>
+              </a:lnSpc>
+              <a:spcBef>
+                <a:spcPts val="0"/>
+              </a:spcBef>
+              <a:spcAft>
+                <a:spcPts val="0"/>
+              </a:spcAft>
+              <a:buClr>
+                <a:srgbClr val="000000"/>
+              </a:buClr>
+              <a:buSzTx/>
+              <a:buFont typeface="Arial"/>
+              <a:buNone/>
+              <a:tabLst/>
+              <a:defRPr/>
+            </a:pPr>
+            <a:endParaRPr kumimoji="0" lang="en-US" sz="1400" b="0" i="0" u="none" strike="noStrike" kern="0" cap="none" spc="0" normalizeH="0" baseline="0" noProof="0" dirty="0">
+              <a:ln>
+                <a:noFill/>
+              </a:ln>
+              <a:solidFill>
+                <a:srgbClr val="FFFFFF"/>
+              </a:solidFill>
+              <a:effectLst/>
+              <a:uLnTx/>
+              <a:uFillTx/>
+              <a:latin typeface="Arial"/>
+              <a:ea typeface="+mn-ea"/>
+              <a:cs typeface="+mn-cs"/>
+              <a:sym typeface="Arial"/>
+            </a:endParaRPr>
+          </a:p>
+        </p:txBody>
+      </p:sp>
+      <p:sp>
+        <p:nvSpPr>
+          <p:cNvPr id="39" name="TextBox 38">
+            <a:extLst>
+              <a:ext uri="{FF2B5EF4-FFF2-40B4-BE49-F238E27FC236}">
+                <a16:creationId xmlns:a16="http://schemas.microsoft.com/office/drawing/2014/main" id="{D3615C0D-E420-4816-9A2B-93DF22CA0F11}"/>
+              </a:ext>
+            </a:extLst>
+          </p:cNvPr>
+          <p:cNvSpPr txBox="1"/>
+          <p:nvPr/>
+        </p:nvSpPr>
+        <p:spPr>
+          <a:xfrm>
+            <a:off x="1079665" y="2600034"/>
+            <a:ext cx="562975" cy="307777"/>
+          </a:xfrm>
+          <a:prstGeom prst="rect">
+            <a:avLst/>
+          </a:prstGeom>
+          <a:noFill/>
+        </p:spPr>
+        <p:txBody>
+          <a:bodyPr wrap="none" rtlCol="0">
+            <a:spAutoFit/>
+          </a:bodyPr>
+          <a:lstStyle/>
+          <a:p>
+            <a:pPr>
+              <a:buClr>
+                <a:srgbClr val="000000"/>
+              </a:buClr>
+              <a:buFont typeface="Arial"/>
+              <a:buNone/>
+            </a:pPr>
+            <a:r>
+              <a:rPr lang="en-US" sz="1400" kern="0" dirty="0">
+                <a:solidFill>
+                  <a:srgbClr val="FFFFFF"/>
+                </a:solidFill>
+                <a:latin typeface="Arial"/>
+                <a:cs typeface="Arial"/>
+                <a:sym typeface="Arial"/>
+              </a:rPr>
+              <a:t>Start</a:t>
+            </a:r>
+          </a:p>
+        </p:txBody>
+      </p:sp>
+    </p:spTree>
+    <p:extLst>
+      <p:ext uri="{BB962C8B-B14F-4D97-AF65-F5344CB8AC3E}">
+        <p14:creationId xmlns:p14="http://schemas.microsoft.com/office/powerpoint/2010/main" val="2617343493"/>
+      </p:ext>
+    </p:extLst>
+  </p:cSld>
+  <p:clrMapOvr>
+    <a:masterClrMapping/>
+  </p:clrMapOvr>
+</p:sld>
+</file>
+
 <file path=ppt/theme/theme1.xml><?xml version="1.0" encoding="utf-8"?>
 <a:theme xmlns:a="http://schemas.openxmlformats.org/drawingml/2006/main" name="Office Theme">
   <a:themeElements>

</xml_diff>